<commit_message>
final comit for PP presentation
</commit_message>
<xml_diff>
--- a/kickstarter_analysis.pptx
+++ b/kickstarter_analysis.pptx
@@ -5,39 +5,47 @@
     <p:sldMasterId id="2147483660" r:id="rId1"/>
   </p:sldMasterIdLst>
   <p:notesMasterIdLst>
-    <p:notesMasterId r:id="rId8"/>
+    <p:notesMasterId r:id="rId9"/>
   </p:notesMasterIdLst>
   <p:sldIdLst>
     <p:sldId id="259" r:id="rId2"/>
     <p:sldId id="279" r:id="rId3"/>
     <p:sldId id="295" r:id="rId4"/>
-    <p:sldId id="262" r:id="rId5"/>
-    <p:sldId id="296" r:id="rId6"/>
-    <p:sldId id="281" r:id="rId7"/>
+    <p:sldId id="297" r:id="rId5"/>
+    <p:sldId id="262" r:id="rId6"/>
+    <p:sldId id="296" r:id="rId7"/>
+    <p:sldId id="281" r:id="rId8"/>
   </p:sldIdLst>
   <p:sldSz cx="9144000" cy="5143500" type="screen16x9"/>
   <p:notesSz cx="6858000" cy="9144000"/>
   <p:embeddedFontLst>
     <p:embeddedFont>
       <p:font typeface="IBM Plex Sans Light" panose="020B0503050203000203" pitchFamily="34" charset="0"/>
-      <p:regular r:id="rId9"/>
-      <p:bold r:id="rId10"/>
-      <p:italic r:id="rId11"/>
-      <p:boldItalic r:id="rId12"/>
+      <p:regular r:id="rId10"/>
+      <p:bold r:id="rId11"/>
+      <p:italic r:id="rId12"/>
+      <p:boldItalic r:id="rId13"/>
     </p:embeddedFont>
     <p:embeddedFont>
       <p:font typeface="IBM Plex Serif" panose="02060503050406000203" pitchFamily="18" charset="77"/>
-      <p:regular r:id="rId13"/>
-      <p:bold r:id="rId14"/>
-      <p:italic r:id="rId15"/>
-      <p:boldItalic r:id="rId16"/>
+      <p:regular r:id="rId14"/>
+      <p:bold r:id="rId15"/>
+      <p:italic r:id="rId16"/>
+      <p:boldItalic r:id="rId17"/>
+    </p:embeddedFont>
+    <p:embeddedFont>
+      <p:font typeface="Lato" panose="020F0502020204030203" pitchFamily="34" charset="77"/>
+      <p:regular r:id="rId18"/>
+      <p:bold r:id="rId19"/>
+      <p:italic r:id="rId20"/>
+      <p:boldItalic r:id="rId21"/>
     </p:embeddedFont>
     <p:embeddedFont>
       <p:font typeface="Raleway" panose="020B0403030101060003" pitchFamily="34" charset="77"/>
-      <p:regular r:id="rId17"/>
-      <p:bold r:id="rId18"/>
-      <p:italic r:id="rId19"/>
-      <p:boldItalic r:id="rId20"/>
+      <p:regular r:id="rId22"/>
+      <p:bold r:id="rId23"/>
+      <p:italic r:id="rId24"/>
+      <p:boldItalic r:id="rId25"/>
     </p:embeddedFont>
   </p:embeddedFontLst>
   <p:defaultTextStyle>
@@ -1040,7 +1048,7 @@
   <p:cSld>
     <p:spTree>
       <p:nvGrpSpPr>
-        <p:cNvPr id="1" name="Shape 243"/>
+        <p:cNvPr id="1" name="Shape 465"/>
         <p:cNvGrpSpPr/>
         <p:nvPr/>
       </p:nvGrpSpPr>
@@ -1054,7 +1062,7 @@
       </p:grpSpPr>
       <p:sp>
         <p:nvSpPr>
-          <p:cNvPr id="244" name="Google Shape;244;p:notes"/>
+          <p:cNvPr id="466" name="Google Shape;466;g35ed75ccf_0134:notes"/>
           <p:cNvSpPr>
             <a:spLocks noGrp="1" noRot="1" noChangeAspect="1"/>
           </p:cNvSpPr>
@@ -1095,7 +1103,7 @@
       </p:sp>
       <p:sp>
         <p:nvSpPr>
-          <p:cNvPr id="245" name="Google Shape;245;p:notes"/>
+          <p:cNvPr id="467" name="Google Shape;467;g35ed75ccf_0134:notes"/>
           <p:cNvSpPr txBox="1">
             <a:spLocks noGrp="1"/>
           </p:cNvSpPr>
@@ -1127,11 +1135,16 @@
               </a:spcAft>
               <a:buNone/>
             </a:pPr>
-            <a:endParaRPr/>
+            <a:endParaRPr dirty="0"/>
           </a:p>
         </p:txBody>
       </p:sp>
     </p:spTree>
+    <p:extLst>
+      <p:ext uri="{BB962C8B-B14F-4D97-AF65-F5344CB8AC3E}">
+        <p14:creationId xmlns:p14="http://schemas.microsoft.com/office/powerpoint/2010/main" val="2561903504"/>
+      </p:ext>
+    </p:extLst>
   </p:cSld>
   <p:clrMapOvr>
     <a:masterClrMapping/>
@@ -1236,6 +1249,110 @@
         </p:txBody>
       </p:sp>
     </p:spTree>
+  </p:cSld>
+  <p:clrMapOvr>
+    <a:masterClrMapping/>
+  </p:clrMapOvr>
+</p:notes>
+</file>
+
+<file path=ppt/notesSlides/notesSlide6.xml><?xml version="1.0" encoding="utf-8"?>
+<p:notes xmlns:a="http://schemas.openxmlformats.org/drawingml/2006/main" xmlns:r="http://schemas.openxmlformats.org/officeDocument/2006/relationships" xmlns:p="http://schemas.openxmlformats.org/presentationml/2006/main" showMasterSp="0" showMasterPhAnim="0">
+  <p:cSld>
+    <p:spTree>
+      <p:nvGrpSpPr>
+        <p:cNvPr id="1" name="Shape 243"/>
+        <p:cNvGrpSpPr/>
+        <p:nvPr/>
+      </p:nvGrpSpPr>
+      <p:grpSpPr>
+        <a:xfrm>
+          <a:off x="0" y="0"/>
+          <a:ext cx="0" cy="0"/>
+          <a:chOff x="0" y="0"/>
+          <a:chExt cx="0" cy="0"/>
+        </a:xfrm>
+      </p:grpSpPr>
+      <p:sp>
+        <p:nvSpPr>
+          <p:cNvPr id="244" name="Google Shape;244;p:notes"/>
+          <p:cNvSpPr>
+            <a:spLocks noGrp="1" noRot="1" noChangeAspect="1"/>
+          </p:cNvSpPr>
+          <p:nvPr>
+            <p:ph type="sldImg" idx="2"/>
+          </p:nvPr>
+        </p:nvSpPr>
+        <p:spPr>
+          <a:xfrm>
+            <a:off x="381000" y="685800"/>
+            <a:ext cx="6096000" cy="3429000"/>
+          </a:xfrm>
+          <a:custGeom>
+            <a:avLst/>
+            <a:gdLst/>
+            <a:ahLst/>
+            <a:cxnLst/>
+            <a:rect l="l" t="t" r="r" b="b"/>
+            <a:pathLst>
+              <a:path w="120000" h="120000" extrusionOk="0">
+                <a:moveTo>
+                  <a:pt x="0" y="0"/>
+                </a:moveTo>
+                <a:lnTo>
+                  <a:pt x="120000" y="0"/>
+                </a:lnTo>
+                <a:lnTo>
+                  <a:pt x="120000" y="120000"/>
+                </a:lnTo>
+                <a:lnTo>
+                  <a:pt x="0" y="120000"/>
+                </a:lnTo>
+                <a:close/>
+              </a:path>
+            </a:pathLst>
+          </a:custGeom>
+        </p:spPr>
+      </p:sp>
+      <p:sp>
+        <p:nvSpPr>
+          <p:cNvPr id="245" name="Google Shape;245;p:notes"/>
+          <p:cNvSpPr txBox="1">
+            <a:spLocks noGrp="1"/>
+          </p:cNvSpPr>
+          <p:nvPr>
+            <p:ph type="body" idx="1"/>
+          </p:nvPr>
+        </p:nvSpPr>
+        <p:spPr>
+          <a:xfrm>
+            <a:off x="685800" y="4343400"/>
+            <a:ext cx="5486400" cy="4114800"/>
+          </a:xfrm>
+          <a:prstGeom prst="rect">
+            <a:avLst/>
+          </a:prstGeom>
+        </p:spPr>
+        <p:txBody>
+          <a:bodyPr spcFirstLastPara="1" wrap="square" lIns="91425" tIns="91425" rIns="91425" bIns="91425" anchor="t" anchorCtr="0">
+            <a:noAutofit/>
+          </a:bodyPr>
+          <a:lstStyle/>
+          <a:p>
+            <a:pPr marL="0" lvl="0" indent="0" algn="l" rtl="0">
+              <a:spcBef>
+                <a:spcPts val="0"/>
+              </a:spcBef>
+              <a:spcAft>
+                <a:spcPts val="0"/>
+              </a:spcAft>
+              <a:buNone/>
+            </a:pPr>
+            <a:endParaRPr dirty="0"/>
+          </a:p>
+        </p:txBody>
+      </p:sp>
+    </p:spTree>
     <p:extLst>
       <p:ext uri="{BB962C8B-B14F-4D97-AF65-F5344CB8AC3E}">
         <p14:creationId xmlns:p14="http://schemas.microsoft.com/office/powerpoint/2010/main" val="2935021501"/>
@@ -1248,7 +1365,7 @@
 </p:notes>
 </file>
 
-<file path=ppt/notesSlides/notesSlide6.xml><?xml version="1.0" encoding="utf-8"?>
+<file path=ppt/notesSlides/notesSlide7.xml><?xml version="1.0" encoding="utf-8"?>
 <p:notes xmlns:a="http://schemas.openxmlformats.org/drawingml/2006/main" xmlns:r="http://schemas.openxmlformats.org/officeDocument/2006/relationships" xmlns:p="http://schemas.openxmlformats.org/presentationml/2006/main" showMasterSp="0" showMasterPhAnim="0">
   <p:cSld>
     <p:spTree>
@@ -5030,7 +5147,7 @@
         </p:nvSpPr>
         <p:spPr>
           <a:xfrm>
-            <a:off x="2922036" y="553844"/>
+            <a:off x="413550" y="173796"/>
             <a:ext cx="5464200" cy="396300"/>
           </a:xfrm>
           <a:prstGeom prst="rect">
@@ -5089,7 +5206,7 @@
               <a:buNone/>
             </a:pPr>
             <a:r>
-              <a:rPr lang="en-US" sz="2200" dirty="0"/>
+              <a:rPr lang="en-US" sz="2200" b="1" dirty="0"/>
               <a:t>Kickstarter is one of the most popular crowdfunding platform on the internet. </a:t>
             </a:r>
           </a:p>
@@ -5097,15 +5214,15 @@
             <a:pPr marL="0" lvl="0" indent="0">
               <a:buNone/>
             </a:pPr>
-            <a:endParaRPr lang="en-US" sz="2200" dirty="0"/>
+            <a:endParaRPr lang="en-US" sz="2200" b="1" dirty="0"/>
           </a:p>
           <a:p>
             <a:pPr marL="0" lvl="0" indent="0">
               <a:buNone/>
             </a:pPr>
             <a:r>
-              <a:rPr lang="en-US" sz="2200" dirty="0"/>
-              <a:t>The aim of this project is to analyze the Kickstarter data collected between 2009 and 2012 to find the best tips for launching a successful campaign.</a:t>
+              <a:rPr lang="en-US" sz="2200" b="1" dirty="0"/>
+              <a:t>The aim of this project is to analyze the Kickstarter dataset to find the best tips for launching a successful campaign.</a:t>
             </a:r>
           </a:p>
           <a:p>
@@ -5223,8 +5340,8 @@
         </p:blipFill>
         <p:spPr>
           <a:xfrm>
-            <a:off x="5727789" y="302853"/>
-            <a:ext cx="2945295" cy="2130552"/>
+            <a:off x="3244820" y="2299819"/>
+            <a:ext cx="3621752" cy="2619884"/>
           </a:xfrm>
           <a:prstGeom prst="rect">
             <a:avLst/>
@@ -5275,10 +5392,80 @@
       </p:sp>
       <p:sp>
         <p:nvSpPr>
-          <p:cNvPr id="9" name="Google Shape;470;p37">
+          <p:cNvPr id="13" name="Rectangle 12">
             <a:extLst>
               <a:ext uri="{FF2B5EF4-FFF2-40B4-BE49-F238E27FC236}">
-                <a16:creationId xmlns:a16="http://schemas.microsoft.com/office/drawing/2014/main" id="{AC727FF8-7A4B-B14C-ACD7-1B22F2C20B4F}"/>
+                <a16:creationId xmlns:a16="http://schemas.microsoft.com/office/drawing/2014/main" id="{86B36FE0-E026-0D4B-98E1-D7EE8C7C5676}"/>
+              </a:ext>
+            </a:extLst>
+          </p:cNvPr>
+          <p:cNvSpPr/>
+          <p:nvPr/>
+        </p:nvSpPr>
+        <p:spPr>
+          <a:xfrm>
+            <a:off x="0" y="977537"/>
+            <a:ext cx="1379621" cy="954107"/>
+          </a:xfrm>
+          <a:prstGeom prst="rect">
+            <a:avLst/>
+          </a:prstGeom>
+        </p:spPr>
+        <p:txBody>
+          <a:bodyPr wrap="square">
+            <a:spAutoFit/>
+          </a:bodyPr>
+          <a:lstStyle/>
+          <a:p>
+            <a:r>
+              <a:rPr lang="en-US" b="1" dirty="0"/>
+              <a:t>What's the best length of time to run a campaign?</a:t>
+            </a:r>
+          </a:p>
+        </p:txBody>
+      </p:sp>
+      <p:sp>
+        <p:nvSpPr>
+          <p:cNvPr id="4" name="Rectangle 3">
+            <a:extLst>
+              <a:ext uri="{FF2B5EF4-FFF2-40B4-BE49-F238E27FC236}">
+                <a16:creationId xmlns:a16="http://schemas.microsoft.com/office/drawing/2014/main" id="{A26BFEB7-8783-8348-BDBC-4076BA8E604A}"/>
+              </a:ext>
+            </a:extLst>
+          </p:cNvPr>
+          <p:cNvSpPr/>
+          <p:nvPr/>
+        </p:nvSpPr>
+        <p:spPr>
+          <a:xfrm>
+            <a:off x="0" y="2202418"/>
+            <a:ext cx="1379621" cy="738664"/>
+          </a:xfrm>
+          <a:prstGeom prst="rect">
+            <a:avLst/>
+          </a:prstGeom>
+        </p:spPr>
+        <p:txBody>
+          <a:bodyPr wrap="square">
+            <a:spAutoFit/>
+          </a:bodyPr>
+          <a:lstStyle/>
+          <a:p>
+            <a:r>
+              <a:rPr lang="en-US" b="1" dirty="0">
+                <a:latin typeface="Helvetica Neue" panose="02000503000000020004" pitchFamily="2" charset="0"/>
+              </a:rPr>
+              <a:t>What's the ideal pledge goal?</a:t>
+            </a:r>
+          </a:p>
+        </p:txBody>
+      </p:sp>
+      <p:sp>
+        <p:nvSpPr>
+          <p:cNvPr id="18" name="Google Shape;469;p37">
+            <a:extLst>
+              <a:ext uri="{FF2B5EF4-FFF2-40B4-BE49-F238E27FC236}">
+                <a16:creationId xmlns:a16="http://schemas.microsoft.com/office/drawing/2014/main" id="{7DC2DB0B-D9B6-5745-B8AA-D64401B7D7BC}"/>
               </a:ext>
             </a:extLst>
           </p:cNvPr>
@@ -5289,8 +5476,8 @@
         </p:nvSpPr>
         <p:spPr>
           <a:xfrm>
-            <a:off x="2670048" y="664644"/>
-            <a:ext cx="6318504" cy="310836"/>
+            <a:off x="74077" y="0"/>
+            <a:ext cx="1706597" cy="752949"/>
           </a:xfrm>
           <a:prstGeom prst="rect">
             <a:avLst/>
@@ -5301,7 +5488,7 @@
           </a:ln>
         </p:spPr>
         <p:txBody>
-          <a:bodyPr spcFirstLastPara="1" wrap="square" lIns="0" tIns="0" rIns="0" bIns="0" anchor="t" anchorCtr="0">
+          <a:bodyPr spcFirstLastPara="1" wrap="square" lIns="0" tIns="0" rIns="0" bIns="0" anchor="b" anchorCtr="0">
             <a:noAutofit/>
           </a:bodyPr>
           <a:lstStyle>
@@ -5316,9 +5503,9 @@
                 <a:spcPts val="0"/>
               </a:spcAft>
             </a:defPPr>
-            <a:lvl1pPr marL="457200" marR="0" lvl="0" indent="-381000" algn="l" rtl="0">
+            <a:lvl1pPr marR="0" lvl="0" algn="l" rtl="0">
               <a:lnSpc>
-                <a:spcPct val="100000"/>
+                <a:spcPct val="90000"/>
               </a:lnSpc>
               <a:spcBef>
                 <a:spcPts val="0"/>
@@ -5327,299 +5514,355 @@
                 <a:spcPts val="0"/>
               </a:spcAft>
               <a:buClr>
-                <a:schemeClr val="accent1"/>
+                <a:schemeClr val="dk1"/>
               </a:buClr>
-              <a:buSzPts val="2400"/>
-              <a:buFont typeface="IBM Plex Sans Light"/>
-              <a:buChar char="▸"/>
-              <a:defRPr sz="2400" b="0" i="0" u="none" strike="noStrike" cap="none">
+              <a:buSzPts val="2800"/>
+              <a:buFont typeface="IBM Plex Serif"/>
+              <a:buNone/>
+              <a:defRPr sz="2800" b="1" i="0" u="none" strike="noStrike" cap="none">
                 <a:solidFill>
                   <a:schemeClr val="dk1"/>
                 </a:solidFill>
-                <a:latin typeface="IBM Plex Sans Light"/>
-                <a:ea typeface="IBM Plex Sans Light"/>
-                <a:cs typeface="IBM Plex Sans Light"/>
-                <a:sym typeface="IBM Plex Sans Light"/>
+                <a:latin typeface="IBM Plex Serif"/>
+                <a:ea typeface="IBM Plex Serif"/>
+                <a:cs typeface="IBM Plex Serif"/>
+                <a:sym typeface="IBM Plex Serif"/>
               </a:defRPr>
             </a:lvl1pPr>
-            <a:lvl2pPr marL="914400" marR="0" lvl="1" indent="-381000" algn="l" rtl="0">
+            <a:lvl2pPr marR="0" lvl="1" algn="l" rtl="0">
               <a:lnSpc>
-                <a:spcPct val="100000"/>
+                <a:spcPct val="90000"/>
               </a:lnSpc>
               <a:spcBef>
-                <a:spcPts val="600"/>
+                <a:spcPts val="0"/>
               </a:spcBef>
               <a:spcAft>
                 <a:spcPts val="0"/>
               </a:spcAft>
               <a:buClr>
-                <a:schemeClr val="accent1"/>
+                <a:schemeClr val="dk1"/>
               </a:buClr>
-              <a:buSzPts val="2400"/>
-              <a:buFont typeface="IBM Plex Sans Light"/>
-              <a:buChar char="▹"/>
-              <a:defRPr sz="2400" b="0" i="0" u="none" strike="noStrike" cap="none">
+              <a:buSzPts val="2800"/>
+              <a:buFont typeface="IBM Plex Serif"/>
+              <a:buNone/>
+              <a:defRPr sz="2800" b="1" i="0" u="none" strike="noStrike" cap="none">
                 <a:solidFill>
                   <a:schemeClr val="dk1"/>
                 </a:solidFill>
-                <a:latin typeface="IBM Plex Sans Light"/>
-                <a:ea typeface="IBM Plex Sans Light"/>
-                <a:cs typeface="IBM Plex Sans Light"/>
-                <a:sym typeface="IBM Plex Sans Light"/>
+                <a:latin typeface="IBM Plex Serif"/>
+                <a:ea typeface="IBM Plex Serif"/>
+                <a:cs typeface="IBM Plex Serif"/>
+                <a:sym typeface="IBM Plex Serif"/>
               </a:defRPr>
             </a:lvl2pPr>
-            <a:lvl3pPr marL="1371600" marR="0" lvl="2" indent="-381000" algn="l" rtl="0">
+            <a:lvl3pPr marR="0" lvl="2" algn="l" rtl="0">
               <a:lnSpc>
-                <a:spcPct val="100000"/>
+                <a:spcPct val="90000"/>
               </a:lnSpc>
               <a:spcBef>
-                <a:spcPts val="600"/>
+                <a:spcPts val="0"/>
               </a:spcBef>
               <a:spcAft>
                 <a:spcPts val="0"/>
               </a:spcAft>
               <a:buClr>
-                <a:schemeClr val="lt2"/>
+                <a:schemeClr val="dk1"/>
               </a:buClr>
-              <a:buSzPts val="2400"/>
-              <a:buFont typeface="IBM Plex Sans Light"/>
-              <a:buChar char="■"/>
-              <a:defRPr sz="2400" b="0" i="0" u="none" strike="noStrike" cap="none">
+              <a:buSzPts val="2800"/>
+              <a:buFont typeface="IBM Plex Serif"/>
+              <a:buNone/>
+              <a:defRPr sz="2800" b="1" i="0" u="none" strike="noStrike" cap="none">
                 <a:solidFill>
                   <a:schemeClr val="dk1"/>
                 </a:solidFill>
-                <a:latin typeface="IBM Plex Sans Light"/>
-                <a:ea typeface="IBM Plex Sans Light"/>
-                <a:cs typeface="IBM Plex Sans Light"/>
-                <a:sym typeface="IBM Plex Sans Light"/>
+                <a:latin typeface="IBM Plex Serif"/>
+                <a:ea typeface="IBM Plex Serif"/>
+                <a:cs typeface="IBM Plex Serif"/>
+                <a:sym typeface="IBM Plex Serif"/>
               </a:defRPr>
             </a:lvl3pPr>
-            <a:lvl4pPr marL="1828800" marR="0" lvl="3" indent="-381000" algn="l" rtl="0">
+            <a:lvl4pPr marR="0" lvl="3" algn="l" rtl="0">
               <a:lnSpc>
-                <a:spcPct val="100000"/>
+                <a:spcPct val="90000"/>
               </a:lnSpc>
               <a:spcBef>
-                <a:spcPts val="600"/>
+                <a:spcPts val="0"/>
               </a:spcBef>
               <a:spcAft>
                 <a:spcPts val="0"/>
               </a:spcAft>
               <a:buClr>
-                <a:schemeClr val="lt2"/>
+                <a:schemeClr val="dk1"/>
               </a:buClr>
-              <a:buSzPts val="2400"/>
-              <a:buFont typeface="IBM Plex Sans Light"/>
-              <a:buChar char="●"/>
-              <a:defRPr sz="2400" b="0" i="0" u="none" strike="noStrike" cap="none">
+              <a:buSzPts val="2800"/>
+              <a:buFont typeface="IBM Plex Serif"/>
+              <a:buNone/>
+              <a:defRPr sz="2800" b="1" i="0" u="none" strike="noStrike" cap="none">
                 <a:solidFill>
                   <a:schemeClr val="dk1"/>
                 </a:solidFill>
-                <a:latin typeface="IBM Plex Sans Light"/>
-                <a:ea typeface="IBM Plex Sans Light"/>
-                <a:cs typeface="IBM Plex Sans Light"/>
-                <a:sym typeface="IBM Plex Sans Light"/>
+                <a:latin typeface="IBM Plex Serif"/>
+                <a:ea typeface="IBM Plex Serif"/>
+                <a:cs typeface="IBM Plex Serif"/>
+                <a:sym typeface="IBM Plex Serif"/>
               </a:defRPr>
             </a:lvl4pPr>
-            <a:lvl5pPr marL="2286000" marR="0" lvl="4" indent="-381000" algn="l" rtl="0">
+            <a:lvl5pPr marR="0" lvl="4" algn="l" rtl="0">
               <a:lnSpc>
-                <a:spcPct val="100000"/>
+                <a:spcPct val="90000"/>
               </a:lnSpc>
               <a:spcBef>
-                <a:spcPts val="600"/>
+                <a:spcPts val="0"/>
               </a:spcBef>
               <a:spcAft>
                 <a:spcPts val="0"/>
               </a:spcAft>
               <a:buClr>
-                <a:schemeClr val="lt2"/>
+                <a:schemeClr val="dk1"/>
               </a:buClr>
-              <a:buSzPts val="2400"/>
-              <a:buFont typeface="IBM Plex Sans Light"/>
-              <a:buChar char="○"/>
-              <a:defRPr sz="2400" b="0" i="0" u="none" strike="noStrike" cap="none">
+              <a:buSzPts val="2800"/>
+              <a:buFont typeface="IBM Plex Serif"/>
+              <a:buNone/>
+              <a:defRPr sz="2800" b="1" i="0" u="none" strike="noStrike" cap="none">
                 <a:solidFill>
                   <a:schemeClr val="dk1"/>
                 </a:solidFill>
-                <a:latin typeface="IBM Plex Sans Light"/>
-                <a:ea typeface="IBM Plex Sans Light"/>
-                <a:cs typeface="IBM Plex Sans Light"/>
-                <a:sym typeface="IBM Plex Sans Light"/>
+                <a:latin typeface="IBM Plex Serif"/>
+                <a:ea typeface="IBM Plex Serif"/>
+                <a:cs typeface="IBM Plex Serif"/>
+                <a:sym typeface="IBM Plex Serif"/>
               </a:defRPr>
             </a:lvl5pPr>
-            <a:lvl6pPr marL="2743200" marR="0" lvl="5" indent="-381000" algn="l" rtl="0">
+            <a:lvl6pPr marR="0" lvl="5" algn="l" rtl="0">
               <a:lnSpc>
-                <a:spcPct val="100000"/>
+                <a:spcPct val="90000"/>
               </a:lnSpc>
               <a:spcBef>
-                <a:spcPts val="600"/>
+                <a:spcPts val="0"/>
               </a:spcBef>
               <a:spcAft>
                 <a:spcPts val="0"/>
               </a:spcAft>
               <a:buClr>
-                <a:schemeClr val="lt2"/>
+                <a:schemeClr val="dk1"/>
               </a:buClr>
-              <a:buSzPts val="2400"/>
-              <a:buFont typeface="IBM Plex Sans Light"/>
-              <a:buChar char="■"/>
-              <a:defRPr sz="2400" b="0" i="0" u="none" strike="noStrike" cap="none">
+              <a:buSzPts val="2800"/>
+              <a:buFont typeface="IBM Plex Serif"/>
+              <a:buNone/>
+              <a:defRPr sz="2800" b="1" i="0" u="none" strike="noStrike" cap="none">
                 <a:solidFill>
                   <a:schemeClr val="dk1"/>
                 </a:solidFill>
-                <a:latin typeface="IBM Plex Sans Light"/>
-                <a:ea typeface="IBM Plex Sans Light"/>
-                <a:cs typeface="IBM Plex Sans Light"/>
-                <a:sym typeface="IBM Plex Sans Light"/>
+                <a:latin typeface="IBM Plex Serif"/>
+                <a:ea typeface="IBM Plex Serif"/>
+                <a:cs typeface="IBM Plex Serif"/>
+                <a:sym typeface="IBM Plex Serif"/>
               </a:defRPr>
             </a:lvl6pPr>
-            <a:lvl7pPr marL="3200400" marR="0" lvl="6" indent="-381000" algn="l" rtl="0">
+            <a:lvl7pPr marR="0" lvl="6" algn="l" rtl="0">
               <a:lnSpc>
-                <a:spcPct val="100000"/>
+                <a:spcPct val="90000"/>
               </a:lnSpc>
               <a:spcBef>
-                <a:spcPts val="600"/>
+                <a:spcPts val="0"/>
               </a:spcBef>
               <a:spcAft>
                 <a:spcPts val="0"/>
               </a:spcAft>
               <a:buClr>
-                <a:schemeClr val="lt2"/>
+                <a:schemeClr val="dk1"/>
               </a:buClr>
-              <a:buSzPts val="2400"/>
-              <a:buFont typeface="IBM Plex Sans Light"/>
-              <a:buChar char="●"/>
-              <a:defRPr sz="2400" b="0" i="0" u="none" strike="noStrike" cap="none">
+              <a:buSzPts val="2800"/>
+              <a:buFont typeface="IBM Plex Serif"/>
+              <a:buNone/>
+              <a:defRPr sz="2800" b="1" i="0" u="none" strike="noStrike" cap="none">
                 <a:solidFill>
                   <a:schemeClr val="dk1"/>
                 </a:solidFill>
-                <a:latin typeface="IBM Plex Sans Light"/>
-                <a:ea typeface="IBM Plex Sans Light"/>
-                <a:cs typeface="IBM Plex Sans Light"/>
-                <a:sym typeface="IBM Plex Sans Light"/>
+                <a:latin typeface="IBM Plex Serif"/>
+                <a:ea typeface="IBM Plex Serif"/>
+                <a:cs typeface="IBM Plex Serif"/>
+                <a:sym typeface="IBM Plex Serif"/>
               </a:defRPr>
             </a:lvl7pPr>
-            <a:lvl8pPr marL="3657600" marR="0" lvl="7" indent="-381000" algn="l" rtl="0">
+            <a:lvl8pPr marR="0" lvl="7" algn="l" rtl="0">
               <a:lnSpc>
-                <a:spcPct val="100000"/>
+                <a:spcPct val="90000"/>
               </a:lnSpc>
               <a:spcBef>
-                <a:spcPts val="600"/>
+                <a:spcPts val="0"/>
               </a:spcBef>
               <a:spcAft>
                 <a:spcPts val="0"/>
               </a:spcAft>
               <a:buClr>
-                <a:schemeClr val="lt2"/>
+                <a:schemeClr val="dk1"/>
               </a:buClr>
-              <a:buSzPts val="2400"/>
-              <a:buFont typeface="IBM Plex Sans Light"/>
-              <a:buChar char="○"/>
-              <a:defRPr sz="2400" b="0" i="0" u="none" strike="noStrike" cap="none">
+              <a:buSzPts val="2800"/>
+              <a:buFont typeface="IBM Plex Serif"/>
+              <a:buNone/>
+              <a:defRPr sz="2800" b="1" i="0" u="none" strike="noStrike" cap="none">
                 <a:solidFill>
                   <a:schemeClr val="dk1"/>
                 </a:solidFill>
-                <a:latin typeface="IBM Plex Sans Light"/>
-                <a:ea typeface="IBM Plex Sans Light"/>
-                <a:cs typeface="IBM Plex Sans Light"/>
-                <a:sym typeface="IBM Plex Sans Light"/>
+                <a:latin typeface="IBM Plex Serif"/>
+                <a:ea typeface="IBM Plex Serif"/>
+                <a:cs typeface="IBM Plex Serif"/>
+                <a:sym typeface="IBM Plex Serif"/>
               </a:defRPr>
             </a:lvl8pPr>
-            <a:lvl9pPr marL="4114800" marR="0" lvl="8" indent="-381000" algn="l" rtl="0">
+            <a:lvl9pPr marR="0" lvl="8" algn="l" rtl="0">
               <a:lnSpc>
-                <a:spcPct val="100000"/>
+                <a:spcPct val="90000"/>
               </a:lnSpc>
               <a:spcBef>
-                <a:spcPts val="600"/>
-              </a:spcBef>
-              <a:spcAft>
-                <a:spcPts val="600"/>
+                <a:spcPts val="0"/>
+              </a:spcBef>
+              <a:spcAft>
+                <a:spcPts val="0"/>
               </a:spcAft>
               <a:buClr>
-                <a:schemeClr val="lt2"/>
+                <a:schemeClr val="dk1"/>
               </a:buClr>
-              <a:buSzPts val="2400"/>
-              <a:buFont typeface="IBM Plex Sans Light"/>
-              <a:buChar char="■"/>
-              <a:defRPr sz="2400" b="0" i="0" u="none" strike="noStrike" cap="none">
+              <a:buSzPts val="2800"/>
+              <a:buFont typeface="IBM Plex Serif"/>
+              <a:buNone/>
+              <a:defRPr sz="2800" b="1" i="0" u="none" strike="noStrike" cap="none">
                 <a:solidFill>
                   <a:schemeClr val="dk1"/>
                 </a:solidFill>
-                <a:latin typeface="IBM Plex Sans Light"/>
-                <a:ea typeface="IBM Plex Sans Light"/>
-                <a:cs typeface="IBM Plex Sans Light"/>
-                <a:sym typeface="IBM Plex Sans Light"/>
+                <a:latin typeface="IBM Plex Serif"/>
+                <a:ea typeface="IBM Plex Serif"/>
+                <a:cs typeface="IBM Plex Serif"/>
+                <a:sym typeface="IBM Plex Serif"/>
               </a:defRPr>
             </a:lvl9pPr>
           </a:lstStyle>
           <a:p>
-            <a:pPr marL="0" indent="0">
-              <a:buFont typeface="IBM Plex Sans Light"/>
-              <a:buNone/>
-            </a:pPr>
-            <a:endParaRPr lang="en-US" sz="1800" dirty="0"/>
+            <a:r>
+              <a:rPr lang="en-US" sz="2400"/>
+              <a:t>Qualitative </a:t>
+            </a:r>
+            <a:br>
+              <a:rPr lang="en-US" sz="2400"/>
+            </a:br>
+            <a:r>
+              <a:rPr lang="en-US" sz="2400"/>
+              <a:t>Analysis</a:t>
+            </a:r>
+            <a:endParaRPr lang="en-US" sz="2400" dirty="0"/>
           </a:p>
         </p:txBody>
       </p:sp>
-      <p:pic>
-        <p:nvPicPr>
-          <p:cNvPr id="21" name="Picture 20">
+      <p:sp>
+        <p:nvSpPr>
+          <p:cNvPr id="11" name="Rectangle 10">
             <a:extLst>
               <a:ext uri="{FF2B5EF4-FFF2-40B4-BE49-F238E27FC236}">
-                <a16:creationId xmlns:a16="http://schemas.microsoft.com/office/drawing/2014/main" id="{846828F9-C10D-EB45-900C-A3BA7F17A20F}"/>
+                <a16:creationId xmlns:a16="http://schemas.microsoft.com/office/drawing/2014/main" id="{1B8D2E50-0372-0645-9ED6-7F766F912CDB}"/>
               </a:ext>
             </a:extLst>
           </p:cNvPr>
-          <p:cNvPicPr>
-            <a:picLocks noChangeAspect="1"/>
-          </p:cNvPicPr>
+          <p:cNvSpPr/>
           <p:nvPr/>
-        </p:nvPicPr>
-        <p:blipFill>
-          <a:blip r:embed="rId4"/>
-          <a:stretch>
-            <a:fillRect/>
-          </a:stretch>
-        </p:blipFill>
+        </p:nvSpPr>
         <p:spPr>
           <a:xfrm>
-            <a:off x="2302038" y="3062598"/>
-            <a:ext cx="3771827" cy="1639704"/>
+            <a:off x="3244820" y="376474"/>
+            <a:ext cx="5557986" cy="1384995"/>
           </a:xfrm>
           <a:prstGeom prst="rect">
             <a:avLst/>
           </a:prstGeom>
         </p:spPr>
-      </p:pic>
-      <p:pic>
-        <p:nvPicPr>
-          <p:cNvPr id="23" name="Picture 22">
+        <p:txBody>
+          <a:bodyPr wrap="square">
+            <a:spAutoFit/>
+          </a:bodyPr>
+          <a:lstStyle/>
+          <a:p>
+            <a:r>
+              <a:rPr lang="en-GB" sz="1200" b="1" dirty="0"/>
+              <a:t>The Kickstarter dataset contains about </a:t>
+            </a:r>
+            <a:r>
+              <a:rPr lang="en-US" sz="1200" b="1" dirty="0"/>
+              <a:t>45,957 records and 17 features which </a:t>
+            </a:r>
+            <a:r>
+              <a:rPr lang="en-GB" sz="1200" b="1" dirty="0"/>
+              <a:t>were collected from opening year in 2009 to 2012.</a:t>
+            </a:r>
+          </a:p>
+          <a:p>
+            <a:endParaRPr lang="en-GB" sz="1200" b="1" dirty="0"/>
+          </a:p>
+          <a:p>
+            <a:r>
+              <a:rPr lang="en-US" sz="1200" b="1" dirty="0"/>
+              <a:t>The total pledged amount is just over $211 million while the minimum goal of launched projects was from 1 cent to $21.5 million. About 50% of the campaigns were successful while the rest failed to meet their minimum goal, were canceled, suspended or were still live.</a:t>
+            </a:r>
+          </a:p>
+        </p:txBody>
+      </p:sp>
+      <p:sp>
+        <p:nvSpPr>
+          <p:cNvPr id="16" name="Rectangle 15">
             <a:extLst>
               <a:ext uri="{FF2B5EF4-FFF2-40B4-BE49-F238E27FC236}">
-                <a16:creationId xmlns:a16="http://schemas.microsoft.com/office/drawing/2014/main" id="{738F9FAD-968F-9642-8DC9-A06F34B4B292}"/>
+                <a16:creationId xmlns:a16="http://schemas.microsoft.com/office/drawing/2014/main" id="{7F51EDF0-ED90-444F-8054-636478628E19}"/>
               </a:ext>
             </a:extLst>
           </p:cNvPr>
-          <p:cNvPicPr>
-            <a:picLocks noChangeAspect="1"/>
-          </p:cNvPicPr>
+          <p:cNvSpPr/>
           <p:nvPr/>
-        </p:nvPicPr>
-        <p:blipFill>
-          <a:blip r:embed="rId5"/>
-          <a:stretch>
-            <a:fillRect/>
-          </a:stretch>
-        </p:blipFill>
+        </p:nvSpPr>
         <p:spPr>
           <a:xfrm>
-            <a:off x="6555848" y="2710095"/>
-            <a:ext cx="2117236" cy="2122569"/>
+            <a:off x="6833903" y="2202418"/>
+            <a:ext cx="2144649" cy="1015663"/>
           </a:xfrm>
           <a:prstGeom prst="rect">
             <a:avLst/>
           </a:prstGeom>
         </p:spPr>
-      </p:pic>
+        <p:txBody>
+          <a:bodyPr wrap="square">
+            <a:spAutoFit/>
+          </a:bodyPr>
+          <a:lstStyle/>
+          <a:p>
+            <a:r>
+              <a:rPr lang="en-US" sz="1200" b="1" dirty="0"/>
+              <a:t>Year     No. of campaigns</a:t>
+            </a:r>
+          </a:p>
+          <a:p>
+            <a:r>
+              <a:rPr lang="en-US" sz="1200" b="1" dirty="0"/>
+              <a:t>2011:   20,182 </a:t>
+            </a:r>
+          </a:p>
+          <a:p>
+            <a:r>
+              <a:rPr lang="en-US" sz="1200" b="1" dirty="0"/>
+              <a:t>2012:   17,822 </a:t>
+            </a:r>
+          </a:p>
+          <a:p>
+            <a:r>
+              <a:rPr lang="en-US" sz="1200" b="1" dirty="0"/>
+              <a:t>2010:   7,253 </a:t>
+            </a:r>
+          </a:p>
+          <a:p>
+            <a:r>
+              <a:rPr lang="en-US" sz="1200" b="1" dirty="0"/>
+              <a:t>2009:   700</a:t>
+            </a:r>
+          </a:p>
+        </p:txBody>
+      </p:sp>
     </p:spTree>
     <p:extLst>
       <p:ext uri="{BB962C8B-B14F-4D97-AF65-F5344CB8AC3E}">
@@ -5638,7 +5881,7 @@
   <p:cSld>
     <p:spTree>
       <p:nvGrpSpPr>
-        <p:cNvPr id="1" name="Shape 246"/>
+        <p:cNvPr id="1" name="Shape 468"/>
         <p:cNvGrpSpPr/>
         <p:nvPr/>
       </p:nvGrpSpPr>
@@ -5652,7 +5895,7 @@
       </p:grpSpPr>
       <p:sp>
         <p:nvSpPr>
-          <p:cNvPr id="249" name="Google Shape;249;p20"/>
+          <p:cNvPr id="471" name="Google Shape;471;p37"/>
           <p:cNvSpPr txBox="1">
             <a:spLocks noGrp="1"/>
           </p:cNvSpPr>
@@ -5688,27 +5931,16 @@
               <a:rPr lang="en" dirty="0"/>
               <a:t>3</a:t>
             </a:r>
-          </a:p>
-          <a:p>
-            <a:pPr marL="0" lvl="0" indent="0" algn="l" rtl="0">
-              <a:spcBef>
-                <a:spcPts val="0"/>
-              </a:spcBef>
-              <a:spcAft>
-                <a:spcPts val="0"/>
-              </a:spcAft>
-              <a:buNone/>
-            </a:pPr>
             <a:endParaRPr dirty="0"/>
           </a:p>
         </p:txBody>
       </p:sp>
       <p:pic>
         <p:nvPicPr>
-          <p:cNvPr id="7" name="Picture 6">
+          <p:cNvPr id="21" name="Picture 20">
             <a:extLst>
               <a:ext uri="{FF2B5EF4-FFF2-40B4-BE49-F238E27FC236}">
-                <a16:creationId xmlns:a16="http://schemas.microsoft.com/office/drawing/2014/main" id="{4D7251AE-EA8F-424D-B5A7-E7077F210D33}"/>
+                <a16:creationId xmlns:a16="http://schemas.microsoft.com/office/drawing/2014/main" id="{846828F9-C10D-EB45-900C-A3BA7F17A20F}"/>
               </a:ext>
             </a:extLst>
           </p:cNvPr>
@@ -5725,8 +5957,8 @@
         </p:blipFill>
         <p:spPr>
           <a:xfrm>
-            <a:off x="5047255" y="137160"/>
-            <a:ext cx="3849857" cy="2849210"/>
+            <a:off x="2764472" y="2941082"/>
+            <a:ext cx="3771827" cy="1639704"/>
           </a:xfrm>
           <a:prstGeom prst="rect">
             <a:avLst/>
@@ -5735,10 +5967,10 @@
       </p:pic>
       <p:pic>
         <p:nvPicPr>
-          <p:cNvPr id="9" name="Picture 8">
+          <p:cNvPr id="23" name="Picture 22">
             <a:extLst>
               <a:ext uri="{FF2B5EF4-FFF2-40B4-BE49-F238E27FC236}">
-                <a16:creationId xmlns:a16="http://schemas.microsoft.com/office/drawing/2014/main" id="{A79611B8-F09C-0448-94C9-77928614A418}"/>
+                <a16:creationId xmlns:a16="http://schemas.microsoft.com/office/drawing/2014/main" id="{738F9FAD-968F-9642-8DC9-A06F34B4B292}"/>
               </a:ext>
             </a:extLst>
           </p:cNvPr>
@@ -5755,15 +5987,680 @@
         </p:blipFill>
         <p:spPr>
           <a:xfrm>
-            <a:off x="4057202" y="3261531"/>
-            <a:ext cx="4858198" cy="1881969"/>
+            <a:off x="6794153" y="2479636"/>
+            <a:ext cx="2117236" cy="2122569"/>
           </a:xfrm>
           <a:prstGeom prst="rect">
             <a:avLst/>
           </a:prstGeom>
         </p:spPr>
       </p:pic>
+      <p:sp>
+        <p:nvSpPr>
+          <p:cNvPr id="13" name="Rectangle 12">
+            <a:extLst>
+              <a:ext uri="{FF2B5EF4-FFF2-40B4-BE49-F238E27FC236}">
+                <a16:creationId xmlns:a16="http://schemas.microsoft.com/office/drawing/2014/main" id="{86B36FE0-E026-0D4B-98E1-D7EE8C7C5676}"/>
+              </a:ext>
+            </a:extLst>
+          </p:cNvPr>
+          <p:cNvSpPr/>
+          <p:nvPr/>
+        </p:nvSpPr>
+        <p:spPr>
+          <a:xfrm>
+            <a:off x="0" y="977537"/>
+            <a:ext cx="1379621" cy="954107"/>
+          </a:xfrm>
+          <a:prstGeom prst="rect">
+            <a:avLst/>
+          </a:prstGeom>
+        </p:spPr>
+        <p:txBody>
+          <a:bodyPr wrap="square">
+            <a:spAutoFit/>
+          </a:bodyPr>
+          <a:lstStyle/>
+          <a:p>
+            <a:r>
+              <a:rPr lang="en-US" b="1" dirty="0"/>
+              <a:t>What's the best length of time to run a campaign?</a:t>
+            </a:r>
+          </a:p>
+        </p:txBody>
+      </p:sp>
+      <p:sp>
+        <p:nvSpPr>
+          <p:cNvPr id="4" name="Rectangle 3">
+            <a:extLst>
+              <a:ext uri="{FF2B5EF4-FFF2-40B4-BE49-F238E27FC236}">
+                <a16:creationId xmlns:a16="http://schemas.microsoft.com/office/drawing/2014/main" id="{A26BFEB7-8783-8348-BDBC-4076BA8E604A}"/>
+              </a:ext>
+            </a:extLst>
+          </p:cNvPr>
+          <p:cNvSpPr/>
+          <p:nvPr/>
+        </p:nvSpPr>
+        <p:spPr>
+          <a:xfrm>
+            <a:off x="0" y="2202418"/>
+            <a:ext cx="1379621" cy="738664"/>
+          </a:xfrm>
+          <a:prstGeom prst="rect">
+            <a:avLst/>
+          </a:prstGeom>
+        </p:spPr>
+        <p:txBody>
+          <a:bodyPr wrap="square">
+            <a:spAutoFit/>
+          </a:bodyPr>
+          <a:lstStyle/>
+          <a:p>
+            <a:r>
+              <a:rPr lang="en-US" b="1" dirty="0">
+                <a:latin typeface="Helvetica Neue" panose="02000503000000020004" pitchFamily="2" charset="0"/>
+              </a:rPr>
+              <a:t>What's the ideal pledge goal?</a:t>
+            </a:r>
+          </a:p>
+        </p:txBody>
+      </p:sp>
+      <p:sp>
+        <p:nvSpPr>
+          <p:cNvPr id="18" name="Google Shape;469;p37">
+            <a:extLst>
+              <a:ext uri="{FF2B5EF4-FFF2-40B4-BE49-F238E27FC236}">
+                <a16:creationId xmlns:a16="http://schemas.microsoft.com/office/drawing/2014/main" id="{7DC2DB0B-D9B6-5745-B8AA-D64401B7D7BC}"/>
+              </a:ext>
+            </a:extLst>
+          </p:cNvPr>
+          <p:cNvSpPr txBox="1">
+            <a:spLocks/>
+          </p:cNvSpPr>
+          <p:nvPr/>
+        </p:nvSpPr>
+        <p:spPr>
+          <a:xfrm>
+            <a:off x="74077" y="0"/>
+            <a:ext cx="1706597" cy="752949"/>
+          </a:xfrm>
+          <a:prstGeom prst="rect">
+            <a:avLst/>
+          </a:prstGeom>
+          <a:noFill/>
+          <a:ln>
+            <a:noFill/>
+          </a:ln>
+        </p:spPr>
+        <p:txBody>
+          <a:bodyPr spcFirstLastPara="1" wrap="square" lIns="0" tIns="0" rIns="0" bIns="0" anchor="b" anchorCtr="0">
+            <a:noAutofit/>
+          </a:bodyPr>
+          <a:lstStyle>
+            <a:defPPr marR="0" lvl="0" algn="l" rtl="0">
+              <a:lnSpc>
+                <a:spcPct val="100000"/>
+              </a:lnSpc>
+              <a:spcBef>
+                <a:spcPts val="0"/>
+              </a:spcBef>
+              <a:spcAft>
+                <a:spcPts val="0"/>
+              </a:spcAft>
+            </a:defPPr>
+            <a:lvl1pPr marR="0" lvl="0" algn="l" rtl="0">
+              <a:lnSpc>
+                <a:spcPct val="90000"/>
+              </a:lnSpc>
+              <a:spcBef>
+                <a:spcPts val="0"/>
+              </a:spcBef>
+              <a:spcAft>
+                <a:spcPts val="0"/>
+              </a:spcAft>
+              <a:buClr>
+                <a:schemeClr val="dk1"/>
+              </a:buClr>
+              <a:buSzPts val="2800"/>
+              <a:buFont typeface="IBM Plex Serif"/>
+              <a:buNone/>
+              <a:defRPr sz="2800" b="1" i="0" u="none" strike="noStrike" cap="none">
+                <a:solidFill>
+                  <a:schemeClr val="dk1"/>
+                </a:solidFill>
+                <a:latin typeface="IBM Plex Serif"/>
+                <a:ea typeface="IBM Plex Serif"/>
+                <a:cs typeface="IBM Plex Serif"/>
+                <a:sym typeface="IBM Plex Serif"/>
+              </a:defRPr>
+            </a:lvl1pPr>
+            <a:lvl2pPr marR="0" lvl="1" algn="l" rtl="0">
+              <a:lnSpc>
+                <a:spcPct val="90000"/>
+              </a:lnSpc>
+              <a:spcBef>
+                <a:spcPts val="0"/>
+              </a:spcBef>
+              <a:spcAft>
+                <a:spcPts val="0"/>
+              </a:spcAft>
+              <a:buClr>
+                <a:schemeClr val="dk1"/>
+              </a:buClr>
+              <a:buSzPts val="2800"/>
+              <a:buFont typeface="IBM Plex Serif"/>
+              <a:buNone/>
+              <a:defRPr sz="2800" b="1" i="0" u="none" strike="noStrike" cap="none">
+                <a:solidFill>
+                  <a:schemeClr val="dk1"/>
+                </a:solidFill>
+                <a:latin typeface="IBM Plex Serif"/>
+                <a:ea typeface="IBM Plex Serif"/>
+                <a:cs typeface="IBM Plex Serif"/>
+                <a:sym typeface="IBM Plex Serif"/>
+              </a:defRPr>
+            </a:lvl2pPr>
+            <a:lvl3pPr marR="0" lvl="2" algn="l" rtl="0">
+              <a:lnSpc>
+                <a:spcPct val="90000"/>
+              </a:lnSpc>
+              <a:spcBef>
+                <a:spcPts val="0"/>
+              </a:spcBef>
+              <a:spcAft>
+                <a:spcPts val="0"/>
+              </a:spcAft>
+              <a:buClr>
+                <a:schemeClr val="dk1"/>
+              </a:buClr>
+              <a:buSzPts val="2800"/>
+              <a:buFont typeface="IBM Plex Serif"/>
+              <a:buNone/>
+              <a:defRPr sz="2800" b="1" i="0" u="none" strike="noStrike" cap="none">
+                <a:solidFill>
+                  <a:schemeClr val="dk1"/>
+                </a:solidFill>
+                <a:latin typeface="IBM Plex Serif"/>
+                <a:ea typeface="IBM Plex Serif"/>
+                <a:cs typeface="IBM Plex Serif"/>
+                <a:sym typeface="IBM Plex Serif"/>
+              </a:defRPr>
+            </a:lvl3pPr>
+            <a:lvl4pPr marR="0" lvl="3" algn="l" rtl="0">
+              <a:lnSpc>
+                <a:spcPct val="90000"/>
+              </a:lnSpc>
+              <a:spcBef>
+                <a:spcPts val="0"/>
+              </a:spcBef>
+              <a:spcAft>
+                <a:spcPts val="0"/>
+              </a:spcAft>
+              <a:buClr>
+                <a:schemeClr val="dk1"/>
+              </a:buClr>
+              <a:buSzPts val="2800"/>
+              <a:buFont typeface="IBM Plex Serif"/>
+              <a:buNone/>
+              <a:defRPr sz="2800" b="1" i="0" u="none" strike="noStrike" cap="none">
+                <a:solidFill>
+                  <a:schemeClr val="dk1"/>
+                </a:solidFill>
+                <a:latin typeface="IBM Plex Serif"/>
+                <a:ea typeface="IBM Plex Serif"/>
+                <a:cs typeface="IBM Plex Serif"/>
+                <a:sym typeface="IBM Plex Serif"/>
+              </a:defRPr>
+            </a:lvl4pPr>
+            <a:lvl5pPr marR="0" lvl="4" algn="l" rtl="0">
+              <a:lnSpc>
+                <a:spcPct val="90000"/>
+              </a:lnSpc>
+              <a:spcBef>
+                <a:spcPts val="0"/>
+              </a:spcBef>
+              <a:spcAft>
+                <a:spcPts val="0"/>
+              </a:spcAft>
+              <a:buClr>
+                <a:schemeClr val="dk1"/>
+              </a:buClr>
+              <a:buSzPts val="2800"/>
+              <a:buFont typeface="IBM Plex Serif"/>
+              <a:buNone/>
+              <a:defRPr sz="2800" b="1" i="0" u="none" strike="noStrike" cap="none">
+                <a:solidFill>
+                  <a:schemeClr val="dk1"/>
+                </a:solidFill>
+                <a:latin typeface="IBM Plex Serif"/>
+                <a:ea typeface="IBM Plex Serif"/>
+                <a:cs typeface="IBM Plex Serif"/>
+                <a:sym typeface="IBM Plex Serif"/>
+              </a:defRPr>
+            </a:lvl5pPr>
+            <a:lvl6pPr marR="0" lvl="5" algn="l" rtl="0">
+              <a:lnSpc>
+                <a:spcPct val="90000"/>
+              </a:lnSpc>
+              <a:spcBef>
+                <a:spcPts val="0"/>
+              </a:spcBef>
+              <a:spcAft>
+                <a:spcPts val="0"/>
+              </a:spcAft>
+              <a:buClr>
+                <a:schemeClr val="dk1"/>
+              </a:buClr>
+              <a:buSzPts val="2800"/>
+              <a:buFont typeface="IBM Plex Serif"/>
+              <a:buNone/>
+              <a:defRPr sz="2800" b="1" i="0" u="none" strike="noStrike" cap="none">
+                <a:solidFill>
+                  <a:schemeClr val="dk1"/>
+                </a:solidFill>
+                <a:latin typeface="IBM Plex Serif"/>
+                <a:ea typeface="IBM Plex Serif"/>
+                <a:cs typeface="IBM Plex Serif"/>
+                <a:sym typeface="IBM Plex Serif"/>
+              </a:defRPr>
+            </a:lvl6pPr>
+            <a:lvl7pPr marR="0" lvl="6" algn="l" rtl="0">
+              <a:lnSpc>
+                <a:spcPct val="90000"/>
+              </a:lnSpc>
+              <a:spcBef>
+                <a:spcPts val="0"/>
+              </a:spcBef>
+              <a:spcAft>
+                <a:spcPts val="0"/>
+              </a:spcAft>
+              <a:buClr>
+                <a:schemeClr val="dk1"/>
+              </a:buClr>
+              <a:buSzPts val="2800"/>
+              <a:buFont typeface="IBM Plex Serif"/>
+              <a:buNone/>
+              <a:defRPr sz="2800" b="1" i="0" u="none" strike="noStrike" cap="none">
+                <a:solidFill>
+                  <a:schemeClr val="dk1"/>
+                </a:solidFill>
+                <a:latin typeface="IBM Plex Serif"/>
+                <a:ea typeface="IBM Plex Serif"/>
+                <a:cs typeface="IBM Plex Serif"/>
+                <a:sym typeface="IBM Plex Serif"/>
+              </a:defRPr>
+            </a:lvl7pPr>
+            <a:lvl8pPr marR="0" lvl="7" algn="l" rtl="0">
+              <a:lnSpc>
+                <a:spcPct val="90000"/>
+              </a:lnSpc>
+              <a:spcBef>
+                <a:spcPts val="0"/>
+              </a:spcBef>
+              <a:spcAft>
+                <a:spcPts val="0"/>
+              </a:spcAft>
+              <a:buClr>
+                <a:schemeClr val="dk1"/>
+              </a:buClr>
+              <a:buSzPts val="2800"/>
+              <a:buFont typeface="IBM Plex Serif"/>
+              <a:buNone/>
+              <a:defRPr sz="2800" b="1" i="0" u="none" strike="noStrike" cap="none">
+                <a:solidFill>
+                  <a:schemeClr val="dk1"/>
+                </a:solidFill>
+                <a:latin typeface="IBM Plex Serif"/>
+                <a:ea typeface="IBM Plex Serif"/>
+                <a:cs typeface="IBM Plex Serif"/>
+                <a:sym typeface="IBM Plex Serif"/>
+              </a:defRPr>
+            </a:lvl8pPr>
+            <a:lvl9pPr marR="0" lvl="8" algn="l" rtl="0">
+              <a:lnSpc>
+                <a:spcPct val="90000"/>
+              </a:lnSpc>
+              <a:spcBef>
+                <a:spcPts val="0"/>
+              </a:spcBef>
+              <a:spcAft>
+                <a:spcPts val="0"/>
+              </a:spcAft>
+              <a:buClr>
+                <a:schemeClr val="dk1"/>
+              </a:buClr>
+              <a:buSzPts val="2800"/>
+              <a:buFont typeface="IBM Plex Serif"/>
+              <a:buNone/>
+              <a:defRPr sz="2800" b="1" i="0" u="none" strike="noStrike" cap="none">
+                <a:solidFill>
+                  <a:schemeClr val="dk1"/>
+                </a:solidFill>
+                <a:latin typeface="IBM Plex Serif"/>
+                <a:ea typeface="IBM Plex Serif"/>
+                <a:cs typeface="IBM Plex Serif"/>
+                <a:sym typeface="IBM Plex Serif"/>
+              </a:defRPr>
+            </a:lvl9pPr>
+          </a:lstStyle>
+          <a:p>
+            <a:r>
+              <a:rPr lang="en-US" sz="2400"/>
+              <a:t>Qualitative </a:t>
+            </a:r>
+            <a:br>
+              <a:rPr lang="en-US" sz="2400"/>
+            </a:br>
+            <a:r>
+              <a:rPr lang="en-US" sz="2400"/>
+              <a:t>Analysis</a:t>
+            </a:r>
+            <a:endParaRPr lang="en-US" sz="2400" dirty="0"/>
+          </a:p>
+        </p:txBody>
+      </p:sp>
+      <p:sp>
+        <p:nvSpPr>
+          <p:cNvPr id="20" name="Google Shape;248;p21">
+            <a:extLst>
+              <a:ext uri="{FF2B5EF4-FFF2-40B4-BE49-F238E27FC236}">
+                <a16:creationId xmlns:a16="http://schemas.microsoft.com/office/drawing/2014/main" id="{AFD3366E-7C20-464C-BF24-57A33F3BD008}"/>
+              </a:ext>
+            </a:extLst>
+          </p:cNvPr>
+          <p:cNvSpPr txBox="1"/>
+          <p:nvPr/>
+        </p:nvSpPr>
+        <p:spPr>
+          <a:xfrm>
+            <a:off x="3544302" y="4561939"/>
+            <a:ext cx="1676401" cy="424896"/>
+          </a:xfrm>
+          <a:prstGeom prst="rect">
+            <a:avLst/>
+          </a:prstGeom>
+          <a:noFill/>
+          <a:ln>
+            <a:noFill/>
+          </a:ln>
+        </p:spPr>
+        <p:txBody>
+          <a:bodyPr spcFirstLastPara="1" wrap="square" lIns="91425" tIns="91425" rIns="91425" bIns="91425" anchor="t" anchorCtr="0">
+            <a:noAutofit/>
+          </a:bodyPr>
+          <a:lstStyle/>
+          <a:p>
+            <a:pPr marL="0" lvl="0" indent="0" algn="ctr" rtl="0">
+              <a:lnSpc>
+                <a:spcPct val="115000"/>
+              </a:lnSpc>
+              <a:spcBef>
+                <a:spcPts val="0"/>
+              </a:spcBef>
+              <a:spcAft>
+                <a:spcPts val="1600"/>
+              </a:spcAft>
+              <a:buClr>
+                <a:srgbClr val="000000"/>
+              </a:buClr>
+              <a:buSzPts val="1100"/>
+              <a:buFont typeface="Arial"/>
+              <a:buNone/>
+            </a:pPr>
+            <a:r>
+              <a:rPr lang="en-GB" sz="2000" b="1" dirty="0">
+                <a:solidFill>
+                  <a:schemeClr val="accent2"/>
+                </a:solidFill>
+                <a:latin typeface="Lato"/>
+                <a:ea typeface="Lato"/>
+                <a:cs typeface="Lato"/>
+                <a:sym typeface="Lato"/>
+              </a:rPr>
+              <a:t>30 days</a:t>
+            </a:r>
+            <a:endParaRPr sz="2000" b="1" dirty="0">
+              <a:solidFill>
+                <a:schemeClr val="accent2"/>
+              </a:solidFill>
+              <a:latin typeface="Lato"/>
+              <a:ea typeface="Lato"/>
+              <a:cs typeface="Lato"/>
+              <a:sym typeface="Lato"/>
+            </a:endParaRPr>
+          </a:p>
+        </p:txBody>
+      </p:sp>
+      <p:sp>
+        <p:nvSpPr>
+          <p:cNvPr id="22" name="Google Shape;250;p21">
+            <a:extLst>
+              <a:ext uri="{FF2B5EF4-FFF2-40B4-BE49-F238E27FC236}">
+                <a16:creationId xmlns:a16="http://schemas.microsoft.com/office/drawing/2014/main" id="{EC1D819E-36B5-8B4D-BA19-F55FD219DF56}"/>
+              </a:ext>
+            </a:extLst>
+          </p:cNvPr>
+          <p:cNvSpPr txBox="1"/>
+          <p:nvPr/>
+        </p:nvSpPr>
+        <p:spPr>
+          <a:xfrm>
+            <a:off x="6922833" y="4558387"/>
+            <a:ext cx="1499329" cy="571533"/>
+          </a:xfrm>
+          <a:prstGeom prst="rect">
+            <a:avLst/>
+          </a:prstGeom>
+          <a:noFill/>
+          <a:ln>
+            <a:noFill/>
+          </a:ln>
+        </p:spPr>
+        <p:txBody>
+          <a:bodyPr spcFirstLastPara="1" wrap="square" lIns="91425" tIns="91425" rIns="91425" bIns="91425" anchor="t" anchorCtr="0">
+            <a:noAutofit/>
+          </a:bodyPr>
+          <a:lstStyle/>
+          <a:p>
+            <a:pPr marL="0" lvl="0" indent="0" algn="ctr" rtl="0">
+              <a:lnSpc>
+                <a:spcPct val="115000"/>
+              </a:lnSpc>
+              <a:spcBef>
+                <a:spcPts val="0"/>
+              </a:spcBef>
+              <a:spcAft>
+                <a:spcPts val="1600"/>
+              </a:spcAft>
+              <a:buClr>
+                <a:srgbClr val="000000"/>
+              </a:buClr>
+              <a:buSzPts val="1100"/>
+              <a:buFont typeface="Arial"/>
+              <a:buNone/>
+            </a:pPr>
+            <a:r>
+              <a:rPr lang="en-GB" sz="2000" b="1" dirty="0">
+                <a:solidFill>
+                  <a:schemeClr val="accent2"/>
+                </a:solidFill>
+                <a:latin typeface="Lato"/>
+                <a:ea typeface="Lato"/>
+                <a:cs typeface="Lato"/>
+                <a:sym typeface="Lato"/>
+              </a:rPr>
+              <a:t>&lt; $5,500</a:t>
+            </a:r>
+            <a:endParaRPr sz="2000" b="1" dirty="0">
+              <a:solidFill>
+                <a:schemeClr val="accent2"/>
+              </a:solidFill>
+              <a:latin typeface="Lato"/>
+              <a:ea typeface="Lato"/>
+              <a:cs typeface="Lato"/>
+              <a:sym typeface="Lato"/>
+            </a:endParaRPr>
+          </a:p>
+        </p:txBody>
+      </p:sp>
+      <p:sp>
+        <p:nvSpPr>
+          <p:cNvPr id="11" name="Rectangle 10">
+            <a:extLst>
+              <a:ext uri="{FF2B5EF4-FFF2-40B4-BE49-F238E27FC236}">
+                <a16:creationId xmlns:a16="http://schemas.microsoft.com/office/drawing/2014/main" id="{1B8D2E50-0372-0645-9ED6-7F766F912CDB}"/>
+              </a:ext>
+            </a:extLst>
+          </p:cNvPr>
+          <p:cNvSpPr/>
+          <p:nvPr/>
+        </p:nvSpPr>
+        <p:spPr>
+          <a:xfrm>
+            <a:off x="2406316" y="245117"/>
+            <a:ext cx="6663607" cy="646331"/>
+          </a:xfrm>
+          <a:prstGeom prst="rect">
+            <a:avLst/>
+          </a:prstGeom>
+        </p:spPr>
+        <p:txBody>
+          <a:bodyPr wrap="square">
+            <a:spAutoFit/>
+          </a:bodyPr>
+          <a:lstStyle/>
+          <a:p>
+            <a:r>
+              <a:rPr lang="en-GB" sz="1200" b="1" dirty="0"/>
+              <a:t>Kickstarter is an “all-or-nothing” platform, meaning that  you keep the money if your goal is successfully met or you lose them. Therefore setting realistic time frames and campaign goals are very important.</a:t>
+            </a:r>
+            <a:endParaRPr lang="en-US" sz="1200" b="1" dirty="0"/>
+          </a:p>
+        </p:txBody>
+      </p:sp>
+      <p:sp>
+        <p:nvSpPr>
+          <p:cNvPr id="14" name="Rectangle 13">
+            <a:extLst>
+              <a:ext uri="{FF2B5EF4-FFF2-40B4-BE49-F238E27FC236}">
+                <a16:creationId xmlns:a16="http://schemas.microsoft.com/office/drawing/2014/main" id="{E785FC53-799F-D441-AD93-ECAA108ED5B4}"/>
+              </a:ext>
+            </a:extLst>
+          </p:cNvPr>
+          <p:cNvSpPr/>
+          <p:nvPr/>
+        </p:nvSpPr>
+        <p:spPr>
+          <a:xfrm>
+            <a:off x="3893536" y="1107093"/>
+            <a:ext cx="2750611" cy="461665"/>
+          </a:xfrm>
+          <a:prstGeom prst="rect">
+            <a:avLst/>
+          </a:prstGeom>
+        </p:spPr>
+        <p:txBody>
+          <a:bodyPr wrap="square">
+            <a:spAutoFit/>
+          </a:bodyPr>
+          <a:lstStyle/>
+          <a:p>
+            <a:r>
+              <a:rPr lang="en-GB" sz="1200" b="1" dirty="0"/>
+              <a:t>Successful campaigns have:</a:t>
+            </a:r>
+          </a:p>
+          <a:p>
+            <a:endParaRPr lang="en-GB" sz="1200" b="1" dirty="0"/>
+          </a:p>
+        </p:txBody>
+      </p:sp>
+      <p:sp>
+        <p:nvSpPr>
+          <p:cNvPr id="16" name="Google Shape;248;p20">
+            <a:extLst>
+              <a:ext uri="{FF2B5EF4-FFF2-40B4-BE49-F238E27FC236}">
+                <a16:creationId xmlns:a16="http://schemas.microsoft.com/office/drawing/2014/main" id="{79D8B18E-3357-A94F-929E-257AC8F95505}"/>
+              </a:ext>
+            </a:extLst>
+          </p:cNvPr>
+          <p:cNvSpPr txBox="1">
+            <a:spLocks noGrp="1"/>
+          </p:cNvSpPr>
+          <p:nvPr>
+            <p:ph type="body" idx="1"/>
+          </p:nvPr>
+        </p:nvSpPr>
+        <p:spPr>
+          <a:xfrm>
+            <a:off x="4232497" y="1428957"/>
+            <a:ext cx="2912644" cy="852126"/>
+          </a:xfrm>
+          <a:prstGeom prst="rect">
+            <a:avLst/>
+          </a:prstGeom>
+        </p:spPr>
+        <p:txBody>
+          <a:bodyPr spcFirstLastPara="1" wrap="square" lIns="0" tIns="0" rIns="0" bIns="0" anchor="t" anchorCtr="0">
+            <a:noAutofit/>
+          </a:bodyPr>
+          <a:lstStyle/>
+          <a:p>
+            <a:pPr marL="342900" indent="-342900">
+              <a:lnSpc>
+                <a:spcPct val="150000"/>
+              </a:lnSpc>
+              <a:buFont typeface="Wingdings" pitchFamily="2" charset="2"/>
+              <a:buChar char="Ø"/>
+            </a:pPr>
+            <a:r>
+              <a:rPr lang="en-GB" sz="1200" b="1" dirty="0">
+                <a:latin typeface="+mn-lt"/>
+              </a:rPr>
+              <a:t>Average duration: 38 days</a:t>
+            </a:r>
+          </a:p>
+          <a:p>
+            <a:pPr marL="342900" indent="-342900">
+              <a:lnSpc>
+                <a:spcPct val="150000"/>
+              </a:lnSpc>
+              <a:buFont typeface="Wingdings" pitchFamily="2" charset="2"/>
+              <a:buChar char="Ø"/>
+            </a:pPr>
+            <a:r>
+              <a:rPr lang="en-GB" sz="1200" b="1" dirty="0">
+                <a:latin typeface="+mn-lt"/>
+              </a:rPr>
+              <a:t>Ideal duration : 30 days</a:t>
+            </a:r>
+          </a:p>
+          <a:p>
+            <a:pPr marL="342900" indent="-342900">
+              <a:lnSpc>
+                <a:spcPct val="150000"/>
+              </a:lnSpc>
+              <a:buFont typeface="Wingdings" pitchFamily="2" charset="2"/>
+              <a:buChar char="Ø"/>
+            </a:pPr>
+            <a:r>
+              <a:rPr lang="en-GB" sz="1200" b="1" dirty="0">
+                <a:latin typeface="+mn-lt"/>
+              </a:rPr>
+              <a:t>Goal: less that $5,500</a:t>
+            </a:r>
+            <a:endParaRPr lang="en-US" sz="1200" b="1" dirty="0">
+              <a:latin typeface="+mn-lt"/>
+            </a:endParaRPr>
+          </a:p>
+        </p:txBody>
+      </p:sp>
     </p:spTree>
+    <p:extLst>
+      <p:ext uri="{BB962C8B-B14F-4D97-AF65-F5344CB8AC3E}">
+        <p14:creationId xmlns:p14="http://schemas.microsoft.com/office/powerpoint/2010/main" val="744652687"/>
+      </p:ext>
+    </p:extLst>
   </p:cSld>
   <p:clrMapOvr>
     <a:masterClrMapping/>
@@ -5824,10 +6721,290 @@
             </a:pPr>
             <a:r>
               <a:rPr lang="en" dirty="0"/>
-              <a:t>3</a:t>
+              <a:t>4</a:t>
+            </a:r>
+          </a:p>
+        </p:txBody>
+      </p:sp>
+      <p:pic>
+        <p:nvPicPr>
+          <p:cNvPr id="7" name="Picture 6">
+            <a:extLst>
+              <a:ext uri="{FF2B5EF4-FFF2-40B4-BE49-F238E27FC236}">
+                <a16:creationId xmlns:a16="http://schemas.microsoft.com/office/drawing/2014/main" id="{4D7251AE-EA8F-424D-B5A7-E7077F210D33}"/>
+              </a:ext>
+            </a:extLst>
+          </p:cNvPr>
+          <p:cNvPicPr>
+            <a:picLocks noChangeAspect="1"/>
+          </p:cNvPicPr>
+          <p:nvPr/>
+        </p:nvPicPr>
+        <p:blipFill>
+          <a:blip r:embed="rId3"/>
+          <a:stretch>
+            <a:fillRect/>
+          </a:stretch>
+        </p:blipFill>
+        <p:spPr>
+          <a:xfrm>
+            <a:off x="5071318" y="48437"/>
+            <a:ext cx="3849857" cy="2849210"/>
+          </a:xfrm>
+          <a:prstGeom prst="rect">
+            <a:avLst/>
+          </a:prstGeom>
+        </p:spPr>
+      </p:pic>
+      <p:pic>
+        <p:nvPicPr>
+          <p:cNvPr id="9" name="Picture 8">
+            <a:extLst>
+              <a:ext uri="{FF2B5EF4-FFF2-40B4-BE49-F238E27FC236}">
+                <a16:creationId xmlns:a16="http://schemas.microsoft.com/office/drawing/2014/main" id="{A79611B8-F09C-0448-94C9-77928614A418}"/>
+              </a:ext>
+            </a:extLst>
+          </p:cNvPr>
+          <p:cNvPicPr>
+            <a:picLocks noChangeAspect="1"/>
+          </p:cNvPicPr>
+          <p:nvPr/>
+        </p:nvPicPr>
+        <p:blipFill>
+          <a:blip r:embed="rId4"/>
+          <a:stretch>
+            <a:fillRect/>
+          </a:stretch>
+        </p:blipFill>
+        <p:spPr>
+          <a:xfrm>
+            <a:off x="3119075" y="3241541"/>
+            <a:ext cx="5126903" cy="1728163"/>
+          </a:xfrm>
+          <a:prstGeom prst="rect">
+            <a:avLst/>
+          </a:prstGeom>
+        </p:spPr>
+      </p:pic>
+      <p:sp>
+        <p:nvSpPr>
+          <p:cNvPr id="5" name="Google Shape;469;p37">
+            <a:extLst>
+              <a:ext uri="{FF2B5EF4-FFF2-40B4-BE49-F238E27FC236}">
+                <a16:creationId xmlns:a16="http://schemas.microsoft.com/office/drawing/2014/main" id="{BD3942B3-9BD0-9642-BDB5-5E8E202F34E7}"/>
+              </a:ext>
+            </a:extLst>
+          </p:cNvPr>
+          <p:cNvSpPr txBox="1">
+            <a:spLocks noGrp="1"/>
+          </p:cNvSpPr>
+          <p:nvPr>
+            <p:ph type="title"/>
+          </p:nvPr>
+        </p:nvSpPr>
+        <p:spPr>
+          <a:xfrm>
+            <a:off x="74077" y="0"/>
+            <a:ext cx="1706597" cy="752949"/>
+          </a:xfrm>
+          <a:prstGeom prst="rect">
+            <a:avLst/>
+          </a:prstGeom>
+        </p:spPr>
+        <p:txBody>
+          <a:bodyPr spcFirstLastPara="1" wrap="square" lIns="0" tIns="0" rIns="0" bIns="0" anchor="b" anchorCtr="0">
+            <a:noAutofit/>
+          </a:bodyPr>
+          <a:lstStyle/>
+          <a:p>
+            <a:pPr marL="0" lvl="0" indent="0" algn="l" rtl="0">
+              <a:spcBef>
+                <a:spcPts val="0"/>
+              </a:spcBef>
+              <a:spcAft>
+                <a:spcPts val="0"/>
+              </a:spcAft>
+              <a:buNone/>
+            </a:pPr>
+            <a:r>
+              <a:rPr lang="en" sz="2400" dirty="0"/>
+              <a:t>Qualitative </a:t>
+            </a:r>
+            <a:br>
+              <a:rPr lang="en" sz="2400" dirty="0"/>
+            </a:br>
+            <a:r>
+              <a:rPr lang="en" sz="2400" dirty="0"/>
+              <a:t>Analysis</a:t>
+            </a:r>
+            <a:endParaRPr sz="2400" dirty="0"/>
+          </a:p>
+        </p:txBody>
+      </p:sp>
+      <p:sp>
+        <p:nvSpPr>
+          <p:cNvPr id="2" name="Rectangle 1">
+            <a:extLst>
+              <a:ext uri="{FF2B5EF4-FFF2-40B4-BE49-F238E27FC236}">
+                <a16:creationId xmlns:a16="http://schemas.microsoft.com/office/drawing/2014/main" id="{7E1F6C46-B0A4-E248-955C-2914EAAEB1ED}"/>
+              </a:ext>
+            </a:extLst>
+          </p:cNvPr>
+          <p:cNvSpPr/>
+          <p:nvPr/>
+        </p:nvSpPr>
+        <p:spPr>
+          <a:xfrm>
+            <a:off x="0" y="1040665"/>
+            <a:ext cx="1634406" cy="1169551"/>
+          </a:xfrm>
+          <a:prstGeom prst="rect">
+            <a:avLst/>
+          </a:prstGeom>
+        </p:spPr>
+        <p:txBody>
+          <a:bodyPr wrap="square">
+            <a:spAutoFit/>
+          </a:bodyPr>
+          <a:lstStyle/>
+          <a:p>
+            <a:r>
+              <a:rPr lang="en-US" b="1" dirty="0">
+                <a:latin typeface="Helvetica Neue" panose="02000503000000020004" pitchFamily="2" charset="0"/>
+              </a:rPr>
+              <a:t>What type of projects would be most </a:t>
             </a:r>
           </a:p>
           <a:p>
+            <a:r>
+              <a:rPr lang="en-US" b="1" dirty="0">
+                <a:latin typeface="Helvetica Neue" panose="02000503000000020004" pitchFamily="2" charset="0"/>
+              </a:rPr>
+              <a:t>successful at getting funded?</a:t>
+            </a:r>
+          </a:p>
+        </p:txBody>
+      </p:sp>
+      <p:sp>
+        <p:nvSpPr>
+          <p:cNvPr id="10" name="Rectangle 9">
+            <a:extLst>
+              <a:ext uri="{FF2B5EF4-FFF2-40B4-BE49-F238E27FC236}">
+                <a16:creationId xmlns:a16="http://schemas.microsoft.com/office/drawing/2014/main" id="{5D199C64-6EDB-4A46-821A-B41FBD2D56B6}"/>
+              </a:ext>
+            </a:extLst>
+          </p:cNvPr>
+          <p:cNvSpPr/>
+          <p:nvPr/>
+        </p:nvSpPr>
+        <p:spPr>
+          <a:xfrm>
+            <a:off x="2759242" y="604287"/>
+            <a:ext cx="2382376" cy="646331"/>
+          </a:xfrm>
+          <a:prstGeom prst="rect">
+            <a:avLst/>
+          </a:prstGeom>
+        </p:spPr>
+        <p:txBody>
+          <a:bodyPr wrap="square">
+            <a:spAutoFit/>
+          </a:bodyPr>
+          <a:lstStyle/>
+          <a:p>
+            <a:r>
+              <a:rPr lang="en-GB" sz="1200" b="1" dirty="0"/>
+              <a:t>Film &amp; Video is the most represented category at Kickstarter</a:t>
+            </a:r>
+            <a:endParaRPr lang="en-US" sz="1200" b="1" dirty="0"/>
+          </a:p>
+        </p:txBody>
+      </p:sp>
+      <p:sp>
+        <p:nvSpPr>
+          <p:cNvPr id="11" name="Rectangle 10">
+            <a:extLst>
+              <a:ext uri="{FF2B5EF4-FFF2-40B4-BE49-F238E27FC236}">
+                <a16:creationId xmlns:a16="http://schemas.microsoft.com/office/drawing/2014/main" id="{18038379-256B-9D46-9CB7-731B76CD4322}"/>
+              </a:ext>
+            </a:extLst>
+          </p:cNvPr>
+          <p:cNvSpPr/>
+          <p:nvPr/>
+        </p:nvSpPr>
+        <p:spPr>
+          <a:xfrm>
+            <a:off x="2234808" y="2072440"/>
+            <a:ext cx="2382376" cy="646331"/>
+          </a:xfrm>
+          <a:prstGeom prst="rect">
+            <a:avLst/>
+          </a:prstGeom>
+        </p:spPr>
+        <p:txBody>
+          <a:bodyPr wrap="square">
+            <a:spAutoFit/>
+          </a:bodyPr>
+          <a:lstStyle/>
+          <a:p>
+            <a:r>
+              <a:rPr lang="en-GB" sz="1200" b="1" dirty="0"/>
+              <a:t>However, the most successful campaigns are from Music and then from Film &amp; Video.</a:t>
+            </a:r>
+            <a:endParaRPr lang="en-US" sz="1200" b="1" dirty="0"/>
+          </a:p>
+        </p:txBody>
+      </p:sp>
+    </p:spTree>
+  </p:cSld>
+  <p:clrMapOvr>
+    <a:masterClrMapping/>
+  </p:clrMapOvr>
+</p:sld>
+</file>
+
+<file path=ppt/slides/slide6.xml><?xml version="1.0" encoding="utf-8"?>
+<p:sld xmlns:a="http://schemas.openxmlformats.org/drawingml/2006/main" xmlns:r="http://schemas.openxmlformats.org/officeDocument/2006/relationships" xmlns:p="http://schemas.openxmlformats.org/presentationml/2006/main">
+  <p:cSld>
+    <p:spTree>
+      <p:nvGrpSpPr>
+        <p:cNvPr id="1" name="Shape 246"/>
+        <p:cNvGrpSpPr/>
+        <p:nvPr/>
+      </p:nvGrpSpPr>
+      <p:grpSpPr>
+        <a:xfrm>
+          <a:off x="0" y="0"/>
+          <a:ext cx="0" cy="0"/>
+          <a:chOff x="0" y="0"/>
+          <a:chExt cx="0" cy="0"/>
+        </a:xfrm>
+      </p:grpSpPr>
+      <p:sp>
+        <p:nvSpPr>
+          <p:cNvPr id="249" name="Google Shape;249;p20"/>
+          <p:cNvSpPr txBox="1">
+            <a:spLocks noGrp="1"/>
+          </p:cNvSpPr>
+          <p:nvPr>
+            <p:ph type="sldNum" idx="12"/>
+          </p:nvPr>
+        </p:nvSpPr>
+        <p:spPr>
+          <a:xfrm>
+            <a:off x="228600" y="4718604"/>
+            <a:ext cx="369900" cy="251100"/>
+          </a:xfrm>
+          <a:prstGeom prst="rect">
+            <a:avLst/>
+          </a:prstGeom>
+        </p:spPr>
+        <p:txBody>
+          <a:bodyPr spcFirstLastPara="1" wrap="square" lIns="0" tIns="0" rIns="0" bIns="0" anchor="ctr" anchorCtr="0">
+            <a:noAutofit/>
+          </a:bodyPr>
+          <a:lstStyle/>
+          <a:p>
             <a:pPr marL="0" lvl="0" indent="0" algn="l" rtl="0">
               <a:spcBef>
                 <a:spcPts val="0"/>
@@ -5837,7 +7014,10 @@
               </a:spcAft>
               <a:buNone/>
             </a:pPr>
-            <a:endParaRPr dirty="0"/>
+            <a:r>
+              <a:rPr lang="en" dirty="0"/>
+              <a:t>5</a:t>
+            </a:r>
           </a:p>
         </p:txBody>
       </p:sp>
@@ -5855,7 +7035,7 @@
         </p:nvGrpSpPr>
         <p:grpSpPr>
           <a:xfrm>
-            <a:off x="5946615" y="158326"/>
+            <a:off x="2738194" y="79163"/>
             <a:ext cx="3206334" cy="4985174"/>
             <a:chOff x="5946615" y="158326"/>
             <a:chExt cx="3206334" cy="4985174"/>
@@ -5952,6 +7132,380 @@
           </p:spPr>
         </p:pic>
       </p:grpSp>
+      <p:sp>
+        <p:nvSpPr>
+          <p:cNvPr id="13" name="Rectangle 12">
+            <a:extLst>
+              <a:ext uri="{FF2B5EF4-FFF2-40B4-BE49-F238E27FC236}">
+                <a16:creationId xmlns:a16="http://schemas.microsoft.com/office/drawing/2014/main" id="{22F49DF2-7F66-6648-AADB-9683CBC34448}"/>
+              </a:ext>
+            </a:extLst>
+          </p:cNvPr>
+          <p:cNvSpPr/>
+          <p:nvPr/>
+        </p:nvSpPr>
+        <p:spPr>
+          <a:xfrm>
+            <a:off x="0" y="1009621"/>
+            <a:ext cx="1634406" cy="954107"/>
+          </a:xfrm>
+          <a:prstGeom prst="rect">
+            <a:avLst/>
+          </a:prstGeom>
+        </p:spPr>
+        <p:txBody>
+          <a:bodyPr wrap="square">
+            <a:spAutoFit/>
+          </a:bodyPr>
+          <a:lstStyle/>
+          <a:p>
+            <a:r>
+              <a:rPr lang="en-US" b="1" dirty="0"/>
+              <a:t>Is there an ideal month/day/time to launch a campaign?</a:t>
+            </a:r>
+          </a:p>
+        </p:txBody>
+      </p:sp>
+      <p:sp>
+        <p:nvSpPr>
+          <p:cNvPr id="16" name="Google Shape;469;p37">
+            <a:extLst>
+              <a:ext uri="{FF2B5EF4-FFF2-40B4-BE49-F238E27FC236}">
+                <a16:creationId xmlns:a16="http://schemas.microsoft.com/office/drawing/2014/main" id="{2ED5ADD6-683E-8D41-8A89-E3880FE580EC}"/>
+              </a:ext>
+            </a:extLst>
+          </p:cNvPr>
+          <p:cNvSpPr txBox="1">
+            <a:spLocks/>
+          </p:cNvSpPr>
+          <p:nvPr/>
+        </p:nvSpPr>
+        <p:spPr>
+          <a:xfrm>
+            <a:off x="74077" y="0"/>
+            <a:ext cx="1706597" cy="752949"/>
+          </a:xfrm>
+          <a:prstGeom prst="rect">
+            <a:avLst/>
+          </a:prstGeom>
+          <a:noFill/>
+          <a:ln>
+            <a:noFill/>
+          </a:ln>
+        </p:spPr>
+        <p:txBody>
+          <a:bodyPr spcFirstLastPara="1" wrap="square" lIns="0" tIns="0" rIns="0" bIns="0" anchor="b" anchorCtr="0">
+            <a:noAutofit/>
+          </a:bodyPr>
+          <a:lstStyle>
+            <a:defPPr marR="0" lvl="0" algn="l" rtl="0">
+              <a:lnSpc>
+                <a:spcPct val="100000"/>
+              </a:lnSpc>
+              <a:spcBef>
+                <a:spcPts val="0"/>
+              </a:spcBef>
+              <a:spcAft>
+                <a:spcPts val="0"/>
+              </a:spcAft>
+            </a:defPPr>
+            <a:lvl1pPr marR="0" lvl="0" algn="l" rtl="0">
+              <a:lnSpc>
+                <a:spcPct val="90000"/>
+              </a:lnSpc>
+              <a:spcBef>
+                <a:spcPts val="0"/>
+              </a:spcBef>
+              <a:spcAft>
+                <a:spcPts val="0"/>
+              </a:spcAft>
+              <a:buClr>
+                <a:schemeClr val="dk1"/>
+              </a:buClr>
+              <a:buSzPts val="2800"/>
+              <a:buFont typeface="IBM Plex Serif"/>
+              <a:buNone/>
+              <a:defRPr sz="2800" b="1" i="0" u="none" strike="noStrike" cap="none">
+                <a:solidFill>
+                  <a:schemeClr val="dk1"/>
+                </a:solidFill>
+                <a:latin typeface="IBM Plex Serif"/>
+                <a:ea typeface="IBM Plex Serif"/>
+                <a:cs typeface="IBM Plex Serif"/>
+                <a:sym typeface="IBM Plex Serif"/>
+              </a:defRPr>
+            </a:lvl1pPr>
+            <a:lvl2pPr marR="0" lvl="1" algn="l" rtl="0">
+              <a:lnSpc>
+                <a:spcPct val="90000"/>
+              </a:lnSpc>
+              <a:spcBef>
+                <a:spcPts val="0"/>
+              </a:spcBef>
+              <a:spcAft>
+                <a:spcPts val="0"/>
+              </a:spcAft>
+              <a:buClr>
+                <a:schemeClr val="dk1"/>
+              </a:buClr>
+              <a:buSzPts val="2800"/>
+              <a:buFont typeface="IBM Plex Serif"/>
+              <a:buNone/>
+              <a:defRPr sz="2800" b="1" i="0" u="none" strike="noStrike" cap="none">
+                <a:solidFill>
+                  <a:schemeClr val="dk1"/>
+                </a:solidFill>
+                <a:latin typeface="IBM Plex Serif"/>
+                <a:ea typeface="IBM Plex Serif"/>
+                <a:cs typeface="IBM Plex Serif"/>
+                <a:sym typeface="IBM Plex Serif"/>
+              </a:defRPr>
+            </a:lvl2pPr>
+            <a:lvl3pPr marR="0" lvl="2" algn="l" rtl="0">
+              <a:lnSpc>
+                <a:spcPct val="90000"/>
+              </a:lnSpc>
+              <a:spcBef>
+                <a:spcPts val="0"/>
+              </a:spcBef>
+              <a:spcAft>
+                <a:spcPts val="0"/>
+              </a:spcAft>
+              <a:buClr>
+                <a:schemeClr val="dk1"/>
+              </a:buClr>
+              <a:buSzPts val="2800"/>
+              <a:buFont typeface="IBM Plex Serif"/>
+              <a:buNone/>
+              <a:defRPr sz="2800" b="1" i="0" u="none" strike="noStrike" cap="none">
+                <a:solidFill>
+                  <a:schemeClr val="dk1"/>
+                </a:solidFill>
+                <a:latin typeface="IBM Plex Serif"/>
+                <a:ea typeface="IBM Plex Serif"/>
+                <a:cs typeface="IBM Plex Serif"/>
+                <a:sym typeface="IBM Plex Serif"/>
+              </a:defRPr>
+            </a:lvl3pPr>
+            <a:lvl4pPr marR="0" lvl="3" algn="l" rtl="0">
+              <a:lnSpc>
+                <a:spcPct val="90000"/>
+              </a:lnSpc>
+              <a:spcBef>
+                <a:spcPts val="0"/>
+              </a:spcBef>
+              <a:spcAft>
+                <a:spcPts val="0"/>
+              </a:spcAft>
+              <a:buClr>
+                <a:schemeClr val="dk1"/>
+              </a:buClr>
+              <a:buSzPts val="2800"/>
+              <a:buFont typeface="IBM Plex Serif"/>
+              <a:buNone/>
+              <a:defRPr sz="2800" b="1" i="0" u="none" strike="noStrike" cap="none">
+                <a:solidFill>
+                  <a:schemeClr val="dk1"/>
+                </a:solidFill>
+                <a:latin typeface="IBM Plex Serif"/>
+                <a:ea typeface="IBM Plex Serif"/>
+                <a:cs typeface="IBM Plex Serif"/>
+                <a:sym typeface="IBM Plex Serif"/>
+              </a:defRPr>
+            </a:lvl4pPr>
+            <a:lvl5pPr marR="0" lvl="4" algn="l" rtl="0">
+              <a:lnSpc>
+                <a:spcPct val="90000"/>
+              </a:lnSpc>
+              <a:spcBef>
+                <a:spcPts val="0"/>
+              </a:spcBef>
+              <a:spcAft>
+                <a:spcPts val="0"/>
+              </a:spcAft>
+              <a:buClr>
+                <a:schemeClr val="dk1"/>
+              </a:buClr>
+              <a:buSzPts val="2800"/>
+              <a:buFont typeface="IBM Plex Serif"/>
+              <a:buNone/>
+              <a:defRPr sz="2800" b="1" i="0" u="none" strike="noStrike" cap="none">
+                <a:solidFill>
+                  <a:schemeClr val="dk1"/>
+                </a:solidFill>
+                <a:latin typeface="IBM Plex Serif"/>
+                <a:ea typeface="IBM Plex Serif"/>
+                <a:cs typeface="IBM Plex Serif"/>
+                <a:sym typeface="IBM Plex Serif"/>
+              </a:defRPr>
+            </a:lvl5pPr>
+            <a:lvl6pPr marR="0" lvl="5" algn="l" rtl="0">
+              <a:lnSpc>
+                <a:spcPct val="90000"/>
+              </a:lnSpc>
+              <a:spcBef>
+                <a:spcPts val="0"/>
+              </a:spcBef>
+              <a:spcAft>
+                <a:spcPts val="0"/>
+              </a:spcAft>
+              <a:buClr>
+                <a:schemeClr val="dk1"/>
+              </a:buClr>
+              <a:buSzPts val="2800"/>
+              <a:buFont typeface="IBM Plex Serif"/>
+              <a:buNone/>
+              <a:defRPr sz="2800" b="1" i="0" u="none" strike="noStrike" cap="none">
+                <a:solidFill>
+                  <a:schemeClr val="dk1"/>
+                </a:solidFill>
+                <a:latin typeface="IBM Plex Serif"/>
+                <a:ea typeface="IBM Plex Serif"/>
+                <a:cs typeface="IBM Plex Serif"/>
+                <a:sym typeface="IBM Plex Serif"/>
+              </a:defRPr>
+            </a:lvl6pPr>
+            <a:lvl7pPr marR="0" lvl="6" algn="l" rtl="0">
+              <a:lnSpc>
+                <a:spcPct val="90000"/>
+              </a:lnSpc>
+              <a:spcBef>
+                <a:spcPts val="0"/>
+              </a:spcBef>
+              <a:spcAft>
+                <a:spcPts val="0"/>
+              </a:spcAft>
+              <a:buClr>
+                <a:schemeClr val="dk1"/>
+              </a:buClr>
+              <a:buSzPts val="2800"/>
+              <a:buFont typeface="IBM Plex Serif"/>
+              <a:buNone/>
+              <a:defRPr sz="2800" b="1" i="0" u="none" strike="noStrike" cap="none">
+                <a:solidFill>
+                  <a:schemeClr val="dk1"/>
+                </a:solidFill>
+                <a:latin typeface="IBM Plex Serif"/>
+                <a:ea typeface="IBM Plex Serif"/>
+                <a:cs typeface="IBM Plex Serif"/>
+                <a:sym typeface="IBM Plex Serif"/>
+              </a:defRPr>
+            </a:lvl7pPr>
+            <a:lvl8pPr marR="0" lvl="7" algn="l" rtl="0">
+              <a:lnSpc>
+                <a:spcPct val="90000"/>
+              </a:lnSpc>
+              <a:spcBef>
+                <a:spcPts val="0"/>
+              </a:spcBef>
+              <a:spcAft>
+                <a:spcPts val="0"/>
+              </a:spcAft>
+              <a:buClr>
+                <a:schemeClr val="dk1"/>
+              </a:buClr>
+              <a:buSzPts val="2800"/>
+              <a:buFont typeface="IBM Plex Serif"/>
+              <a:buNone/>
+              <a:defRPr sz="2800" b="1" i="0" u="none" strike="noStrike" cap="none">
+                <a:solidFill>
+                  <a:schemeClr val="dk1"/>
+                </a:solidFill>
+                <a:latin typeface="IBM Plex Serif"/>
+                <a:ea typeface="IBM Plex Serif"/>
+                <a:cs typeface="IBM Plex Serif"/>
+                <a:sym typeface="IBM Plex Serif"/>
+              </a:defRPr>
+            </a:lvl8pPr>
+            <a:lvl9pPr marR="0" lvl="8" algn="l" rtl="0">
+              <a:lnSpc>
+                <a:spcPct val="90000"/>
+              </a:lnSpc>
+              <a:spcBef>
+                <a:spcPts val="0"/>
+              </a:spcBef>
+              <a:spcAft>
+                <a:spcPts val="0"/>
+              </a:spcAft>
+              <a:buClr>
+                <a:schemeClr val="dk1"/>
+              </a:buClr>
+              <a:buSzPts val="2800"/>
+              <a:buFont typeface="IBM Plex Serif"/>
+              <a:buNone/>
+              <a:defRPr sz="2800" b="1" i="0" u="none" strike="noStrike" cap="none">
+                <a:solidFill>
+                  <a:schemeClr val="dk1"/>
+                </a:solidFill>
+                <a:latin typeface="IBM Plex Serif"/>
+                <a:ea typeface="IBM Plex Serif"/>
+                <a:cs typeface="IBM Plex Serif"/>
+                <a:sym typeface="IBM Plex Serif"/>
+              </a:defRPr>
+            </a:lvl9pPr>
+          </a:lstStyle>
+          <a:p>
+            <a:r>
+              <a:rPr lang="en-US" sz="2400" dirty="0"/>
+              <a:t>Qualitative </a:t>
+            </a:r>
+            <a:br>
+              <a:rPr lang="en-US" sz="2400" dirty="0"/>
+            </a:br>
+            <a:r>
+              <a:rPr lang="en-US" sz="2400" dirty="0"/>
+              <a:t>Analysis</a:t>
+            </a:r>
+          </a:p>
+        </p:txBody>
+      </p:sp>
+      <p:sp>
+        <p:nvSpPr>
+          <p:cNvPr id="15" name="Rectangle 14">
+            <a:extLst>
+              <a:ext uri="{FF2B5EF4-FFF2-40B4-BE49-F238E27FC236}">
+                <a16:creationId xmlns:a16="http://schemas.microsoft.com/office/drawing/2014/main" id="{8D7DF78E-FB91-B348-BA60-E515010C3A55}"/>
+              </a:ext>
+            </a:extLst>
+          </p:cNvPr>
+          <p:cNvSpPr/>
+          <p:nvPr/>
+        </p:nvSpPr>
+        <p:spPr>
+          <a:xfrm>
+            <a:off x="6337589" y="2043469"/>
+            <a:ext cx="2594871" cy="1077218"/>
+          </a:xfrm>
+          <a:prstGeom prst="rect">
+            <a:avLst/>
+          </a:prstGeom>
+        </p:spPr>
+        <p:txBody>
+          <a:bodyPr wrap="square">
+            <a:spAutoFit/>
+          </a:bodyPr>
+          <a:lstStyle/>
+          <a:p>
+            <a:r>
+              <a:rPr lang="en-US" sz="1200" b="1" dirty="0">
+                <a:latin typeface="Helvetica Neue" panose="02000503000000020004" pitchFamily="2" charset="0"/>
+              </a:rPr>
+              <a:t>The most successful campaigns were funded in spring, on a Saturday at 3-4am.</a:t>
+            </a:r>
+            <a:endParaRPr lang="en-US" b="1" dirty="0">
+              <a:latin typeface="Helvetica Neue" panose="02000503000000020004" pitchFamily="2" charset="0"/>
+            </a:endParaRPr>
+          </a:p>
+          <a:p>
+            <a:endParaRPr lang="en-US" dirty="0">
+              <a:latin typeface="Helvetica Neue" panose="02000503000000020004" pitchFamily="2" charset="0"/>
+            </a:endParaRPr>
+          </a:p>
+          <a:p>
+            <a:endParaRPr lang="en-US" dirty="0"/>
+          </a:p>
+        </p:txBody>
+      </p:sp>
     </p:spTree>
     <p:extLst>
       <p:ext uri="{BB962C8B-B14F-4D97-AF65-F5344CB8AC3E}">
@@ -5965,7 +7519,7 @@
 </p:sld>
 </file>
 
-<file path=ppt/slides/slide6.xml><?xml version="1.0" encoding="utf-8"?>
+<file path=ppt/slides/slide7.xml><?xml version="1.0" encoding="utf-8"?>
 <p:sld xmlns:a="http://schemas.openxmlformats.org/drawingml/2006/main" xmlns:r="http://schemas.openxmlformats.org/officeDocument/2006/relationships" xmlns:p="http://schemas.openxmlformats.org/presentationml/2006/main">
   <p:cSld>
     <p:spTree>
@@ -6036,7 +7590,7 @@
         </p:nvSpPr>
         <p:spPr>
           <a:xfrm>
-            <a:off x="4136642" y="2463428"/>
+            <a:off x="4058653" y="2504371"/>
             <a:ext cx="5861700" cy="387600"/>
           </a:xfrm>
           <a:prstGeom prst="rect">

</xml_diff>

<commit_message>
minor fix on presentation
</commit_message>
<xml_diff>
--- a/kickstarter_analysis.pptx
+++ b/kickstarter_analysis.pptx
@@ -6419,7 +6419,7 @@
                 <a:cs typeface="Lato"/>
                 <a:sym typeface="Lato"/>
               </a:rPr>
-              <a:t>&lt; $5,500</a:t>
+              <a:t> $5,484</a:t>
             </a:r>
             <a:endParaRPr sz="2000" b="1" dirty="0">
               <a:solidFill>
@@ -6577,7 +6577,7 @@
               <a:rPr lang="en-GB" sz="1200" b="1" dirty="0">
                 <a:latin typeface="+mn-lt"/>
               </a:rPr>
-              <a:t>Goal: less that $5,500</a:t>
+              <a:t>Goal average: $5,484</a:t>
             </a:r>
             <a:endParaRPr lang="en-US" sz="1200" b="1" dirty="0">
               <a:latin typeface="+mn-lt"/>

</xml_diff>

<commit_message>
add more to analysis
</commit_message>
<xml_diff>
--- a/kickstarter_analysis.pptx
+++ b/kickstarter_analysis.pptx
@@ -6482,7 +6482,7 @@
         </p:nvSpPr>
         <p:spPr>
           <a:xfrm>
-            <a:off x="3893536" y="1107093"/>
+            <a:off x="3907184" y="906818"/>
             <a:ext cx="2750611" cy="461665"/>
           </a:xfrm>
           <a:prstGeom prst="rect">
@@ -6523,8 +6523,8 @@
         </p:nvSpPr>
         <p:spPr>
           <a:xfrm>
-            <a:off x="4232497" y="1428957"/>
-            <a:ext cx="2912644" cy="852126"/>
+            <a:off x="4205202" y="1153467"/>
+            <a:ext cx="2912644" cy="1418283"/>
           </a:xfrm>
           <a:prstGeom prst="rect">
             <a:avLst/>
@@ -6577,11 +6577,38 @@
               <a:rPr lang="en-GB" sz="1200" b="1" dirty="0">
                 <a:latin typeface="+mn-lt"/>
               </a:rPr>
-              <a:t>Goal average: $5,484</a:t>
+              <a:t>Average goal: $5,484</a:t>
             </a:r>
-            <a:endParaRPr lang="en-US" sz="1200" b="1" dirty="0">
-              <a:latin typeface="+mn-lt"/>
-            </a:endParaRPr>
+          </a:p>
+          <a:p>
+            <a:pPr marL="342900" indent="-342900">
+              <a:lnSpc>
+                <a:spcPct val="150000"/>
+              </a:lnSpc>
+              <a:buFont typeface="Wingdings" pitchFamily="2" charset="2"/>
+              <a:buChar char="Ø"/>
+            </a:pPr>
+            <a:r>
+              <a:rPr lang="en-US" sz="1200" b="1" dirty="0">
+                <a:latin typeface="+mn-lt"/>
+              </a:rPr>
+              <a:t>Average updates: 7</a:t>
+            </a:r>
+          </a:p>
+          <a:p>
+            <a:pPr marL="342900" indent="-342900">
+              <a:lnSpc>
+                <a:spcPct val="150000"/>
+              </a:lnSpc>
+              <a:buFont typeface="Wingdings" pitchFamily="2" charset="2"/>
+              <a:buChar char="Ø"/>
+            </a:pPr>
+            <a:r>
+              <a:rPr lang="en-US" sz="1200" b="1" dirty="0">
+                <a:latin typeface="+mn-lt"/>
+              </a:rPr>
+              <a:t>Average comments: 14</a:t>
+            </a:r>
           </a:p>
         </p:txBody>
       </p:sp>

</xml_diff>